<commit_message>
The powerpoint update reflects the new bi-weekly schedule; the second file is the newly created activity diagram.
</commit_message>
<xml_diff>
--- a/Initial_presentation/Initial presentation.pptx
+++ b/Initial_presentation/Initial presentation.pptx
@@ -397,11 +397,11 @@
           <c:showBubbleSize val="0"/>
         </c:dLbls>
         <c:gapWidth val="150"/>
-        <c:axId val="91653248"/>
-        <c:axId val="91654784"/>
+        <c:axId val="119806976"/>
+        <c:axId val="119808768"/>
       </c:barChart>
       <c:catAx>
-        <c:axId val="91653248"/>
+        <c:axId val="119806976"/>
         <c:scaling>
           <c:orientation val="minMax"/>
         </c:scaling>
@@ -413,7 +413,7 @@
         <c:spPr>
           <a:ln w="6350"/>
         </c:spPr>
-        <c:crossAx val="91654784"/>
+        <c:crossAx val="119808768"/>
         <c:crosses val="autoZero"/>
         <c:auto val="1"/>
         <c:lblAlgn val="ctr"/>
@@ -421,7 +421,7 @@
         <c:noMultiLvlLbl val="0"/>
       </c:catAx>
       <c:valAx>
-        <c:axId val="91654784"/>
+        <c:axId val="119808768"/>
         <c:scaling>
           <c:orientation val="minMax"/>
         </c:scaling>
@@ -445,7 +445,7 @@
             <a:noFill/>
           </a:ln>
         </c:spPr>
-        <c:crossAx val="91653248"/>
+        <c:crossAx val="119806976"/>
         <c:crosses val="autoZero"/>
         <c:crossBetween val="between"/>
       </c:valAx>
@@ -889,7 +889,7 @@
                 <a:cs typeface="Arial" pitchFamily="34" charset="0"/>
               </a:rPr>
               <a:pPr/>
-              <a:t>04/02/2014</a:t>
+              <a:t>09/02/2014</a:t>
             </a:fld>
             <a:endParaRPr lang="en-GB" sz="800" dirty="0">
               <a:latin typeface="Arial" pitchFamily="34" charset="0"/>
@@ -1095,7 +1095,7 @@
             <a:fld id="{FA175E2C-59E1-4EF1-A36A-FD7E50E71E80}" type="datetimeFigureOut">
               <a:rPr lang="en-GB" smtClean="0"/>
               <a:pPr/>
-              <a:t>04/02/2014</a:t>
+              <a:t>09/02/2014</a:t>
             </a:fld>
             <a:endParaRPr lang="en-GB" dirty="0"/>
           </a:p>
@@ -2066,7 +2066,7 @@
             <a:fld id="{9D21D778-B565-4D7E-94D7-64010A445B68}" type="datetimeFigureOut">
               <a:rPr lang="en-US" smtClean="0"/>
               <a:pPr eaLnBrk="1" latinLnBrk="0" hangingPunct="1"/>
-              <a:t>2/4/2014</a:t>
+              <a:t>2/9/2014</a:t>
             </a:fld>
             <a:endParaRPr lang="en-US"/>
           </a:p>
@@ -2603,7 +2603,7 @@
             <a:fld id="{9D21D778-B565-4D7E-94D7-64010A445B68}" type="datetimeFigureOut">
               <a:rPr lang="en-US" smtClean="0"/>
               <a:pPr eaLnBrk="1" latinLnBrk="0" hangingPunct="1"/>
-              <a:t>2/4/2014</a:t>
+              <a:t>2/9/2014</a:t>
             </a:fld>
             <a:endParaRPr lang="en-US"/>
           </a:p>
@@ -2929,7 +2929,7 @@
             <a:fld id="{9D21D778-B565-4D7E-94D7-64010A445B68}" type="datetimeFigureOut">
               <a:rPr lang="en-US" smtClean="0"/>
               <a:pPr eaLnBrk="1" latinLnBrk="0" hangingPunct="1"/>
-              <a:t>2/4/2014</a:t>
+              <a:t>2/9/2014</a:t>
             </a:fld>
             <a:endParaRPr lang="en-US"/>
           </a:p>
@@ -5675,7 +5675,7 @@
             <a:fld id="{9D21D778-B565-4D7E-94D7-64010A445B68}" type="datetimeFigureOut">
               <a:rPr lang="en-US" smtClean="0"/>
               <a:pPr eaLnBrk="1" latinLnBrk="0" hangingPunct="1"/>
-              <a:t>2/4/2014</a:t>
+              <a:t>2/9/2014</a:t>
             </a:fld>
             <a:endParaRPr lang="en-US"/>
           </a:p>
@@ -8395,7 +8395,7 @@
             <a:fld id="{9D21D778-B565-4D7E-94D7-64010A445B68}" type="datetimeFigureOut">
               <a:rPr lang="en-US" smtClean="0"/>
               <a:pPr eaLnBrk="1" latinLnBrk="0" hangingPunct="1"/>
-              <a:t>2/4/2014</a:t>
+              <a:t>2/9/2014</a:t>
             </a:fld>
             <a:endParaRPr lang="en-US"/>
           </a:p>
@@ -8518,7 +8518,7 @@
             <a:fld id="{9D21D778-B565-4D7E-94D7-64010A445B68}" type="datetimeFigureOut">
               <a:rPr lang="en-US" smtClean="0"/>
               <a:pPr eaLnBrk="1" latinLnBrk="0" hangingPunct="1"/>
-              <a:t>2/4/2014</a:t>
+              <a:t>2/9/2014</a:t>
             </a:fld>
             <a:endParaRPr lang="en-US"/>
           </a:p>
@@ -9239,7 +9239,7 @@
             <a:fld id="{9D21D778-B565-4D7E-94D7-64010A445B68}" type="datetimeFigureOut">
               <a:rPr lang="en-US" smtClean="0"/>
               <a:pPr eaLnBrk="1" latinLnBrk="0" hangingPunct="1"/>
-              <a:t>2/4/2014</a:t>
+              <a:t>2/9/2014</a:t>
             </a:fld>
             <a:endParaRPr lang="en-US"/>
           </a:p>
@@ -9503,7 +9503,7 @@
             <a:fld id="{9D21D778-B565-4D7E-94D7-64010A445B68}" type="datetimeFigureOut">
               <a:rPr lang="en-US" smtClean="0"/>
               <a:pPr eaLnBrk="1" latinLnBrk="0" hangingPunct="1"/>
-              <a:t>2/4/2014</a:t>
+              <a:t>2/9/2014</a:t>
             </a:fld>
             <a:endParaRPr lang="en-US"/>
           </a:p>
@@ -9744,7 +9744,7 @@
             <a:fld id="{9D21D778-B565-4D7E-94D7-64010A445B68}" type="datetimeFigureOut">
               <a:rPr lang="en-US" smtClean="0"/>
               <a:pPr eaLnBrk="1" latinLnBrk="0" hangingPunct="1"/>
-              <a:t>2/4/2014</a:t>
+              <a:t>2/9/2014</a:t>
             </a:fld>
             <a:endParaRPr lang="en-US"/>
           </a:p>
@@ -10030,7 +10030,7 @@
             <a:fld id="{9D21D778-B565-4D7E-94D7-64010A445B68}" type="datetimeFigureOut">
               <a:rPr lang="en-US" smtClean="0"/>
               <a:pPr eaLnBrk="1" latinLnBrk="0" hangingPunct="1"/>
-              <a:t>2/4/2014</a:t>
+              <a:t>2/9/2014</a:t>
             </a:fld>
             <a:endParaRPr lang="en-US"/>
           </a:p>
@@ -10328,7 +10328,7 @@
             <a:fld id="{9D21D778-B565-4D7E-94D7-64010A445B68}" type="datetimeFigureOut">
               <a:rPr lang="en-US" smtClean="0"/>
               <a:pPr eaLnBrk="1" latinLnBrk="0" hangingPunct="1"/>
-              <a:t>2/4/2014</a:t>
+              <a:t>2/9/2014</a:t>
             </a:fld>
             <a:endParaRPr lang="en-US" dirty="0"/>
           </a:p>
@@ -10608,7 +10608,7 @@
             <a:fld id="{9D21D778-B565-4D7E-94D7-64010A445B68}" type="datetimeFigureOut">
               <a:rPr lang="en-US" smtClean="0"/>
               <a:pPr algn="r" eaLnBrk="1" latinLnBrk="0" hangingPunct="1"/>
-              <a:t>2/4/2014</a:t>
+              <a:t>2/9/2014</a:t>
             </a:fld>
             <a:endParaRPr lang="en-US" sz="1400" dirty="0">
               <a:solidFill>
@@ -11126,23 +11126,7 @@
                   <a:srgbClr val="FF0000"/>
                 </a:solidFill>
               </a:rPr>
-              <a:t>Android </a:t>
-            </a:r>
-            <a:r>
-              <a:rPr lang="en-GB" sz="3600" b="1" dirty="0" smtClean="0">
-                <a:solidFill>
-                  <a:srgbClr val="FF0000"/>
-                </a:solidFill>
-              </a:rPr>
-              <a:t>Programming Class</a:t>
-            </a:r>
-            <a:r>
-              <a:rPr lang="en-GB" sz="3600" b="1" dirty="0" smtClean="0">
-                <a:solidFill>
-                  <a:srgbClr val="FF0000"/>
-                </a:solidFill>
-              </a:rPr>
-              <a:t>:</a:t>
+              <a:t>Android Programming Class:</a:t>
             </a:r>
             <a:br>
               <a:rPr lang="en-GB" sz="3600" b="1" dirty="0" smtClean="0">
@@ -11432,15 +11416,7 @@
                   <a:srgbClr val="FF0000"/>
                 </a:solidFill>
               </a:rPr>
-              <a:t>Project </a:t>
-            </a:r>
-            <a:r>
-              <a:rPr lang="en-GB" sz="1800" b="1" u="sng" dirty="0" smtClean="0">
-                <a:solidFill>
-                  <a:srgbClr val="FF0000"/>
-                </a:solidFill>
-              </a:rPr>
-              <a:t>Name:</a:t>
+              <a:t>Project Name:</a:t>
             </a:r>
             <a:r>
               <a:rPr lang="en-GB" sz="1800" b="1" dirty="0" smtClean="0">
@@ -11479,7 +11455,6 @@
               <a:rPr lang="en-GB" dirty="0" smtClean="0"/>
               <a:t>    A Dog will herd many Sheep – providing guidance and security </a:t>
             </a:r>
-            <a:endParaRPr lang="en-GB" dirty="0" smtClean="0"/>
           </a:p>
           <a:p>
             <a:pPr marL="0" indent="0">
@@ -11491,15 +11466,7 @@
             </a:r>
             <a:r>
               <a:rPr lang="en-GB" dirty="0" smtClean="0"/>
-              <a:t>    </a:t>
-            </a:r>
-            <a:r>
-              <a:rPr lang="en-GB" dirty="0" smtClean="0"/>
-              <a:t>for </a:t>
-            </a:r>
-            <a:r>
-              <a:rPr lang="en-GB" dirty="0" smtClean="0"/>
-              <a:t>all Sheep. </a:t>
+              <a:t>    for all Sheep. </a:t>
             </a:r>
           </a:p>
           <a:p>
@@ -11590,7 +11557,6 @@
               <a:rPr lang="en-GB" dirty="0" smtClean="0"/>
               <a:t>               -Allow to go in the direction of up, right and left (not backward </a:t>
             </a:r>
-            <a:endParaRPr lang="en-GB" dirty="0" smtClean="0"/>
           </a:p>
           <a:p>
             <a:pPr marL="0" indent="0">
@@ -11602,23 +11568,7 @@
             </a:r>
             <a:r>
               <a:rPr lang="en-GB" dirty="0" smtClean="0"/>
-              <a:t>                 </a:t>
-            </a:r>
-            <a:r>
-              <a:rPr lang="en-GB" dirty="0" smtClean="0"/>
-              <a:t>or </a:t>
-            </a:r>
-            <a:r>
-              <a:rPr lang="en-GB" dirty="0" smtClean="0"/>
-              <a:t>behind </a:t>
-            </a:r>
-            <a:r>
-              <a:rPr lang="en-GB" dirty="0" smtClean="0"/>
-              <a:t>the </a:t>
-            </a:r>
-            <a:r>
-              <a:rPr lang="en-GB" dirty="0" smtClean="0"/>
-              <a:t>dog) </a:t>
+              <a:t>                 or behind the dog) </a:t>
             </a:r>
           </a:p>
           <a:p>
@@ -11770,7 +11720,6 @@
               <a:rPr lang="en-US" dirty="0" smtClean="0"/>
               <a:t>        - Controlled by either touch screen / </a:t>
             </a:r>
-            <a:endParaRPr lang="en-US" dirty="0" smtClean="0"/>
           </a:p>
           <a:p>
             <a:pPr marL="0" indent="0">
@@ -11782,13 +11731,8 @@
             </a:r>
             <a:r>
               <a:rPr lang="en-US" dirty="0" smtClean="0"/>
-              <a:t>        </a:t>
-            </a:r>
-            <a:r>
-              <a:rPr lang="en-US" dirty="0" smtClean="0"/>
-              <a:t>  keyboard</a:t>
-            </a:r>
-            <a:endParaRPr lang="en-US" dirty="0" smtClean="0"/>
+              <a:t>          keyboard</a:t>
+            </a:r>
           </a:p>
           <a:p>
             <a:pPr marL="0" indent="0">
@@ -11944,7 +11888,7 @@
         </p:spPr>
         <p:txBody>
           <a:bodyPr>
-            <a:normAutofit fontScale="77500" lnSpcReduction="20000"/>
+            <a:normAutofit fontScale="70000" lnSpcReduction="20000"/>
           </a:bodyPr>
           <a:lstStyle/>
           <a:p>
@@ -11990,37 +11934,13 @@
           <a:p>
             <a:r>
               <a:rPr lang="en-GB" dirty="0" smtClean="0"/>
-              <a:t>Using Java </a:t>
-            </a:r>
+              <a:t>Using Java API- creating classes; implementing interfaces </a:t>
+            </a:r>
+          </a:p>
+          <a:p>
             <a:r>
               <a:rPr lang="en-GB" dirty="0" smtClean="0"/>
-              <a:t>API- </a:t>
-            </a:r>
-            <a:r>
-              <a:rPr lang="en-GB" dirty="0" smtClean="0"/>
-              <a:t>creating classes; implementing interfaces </a:t>
-            </a:r>
-          </a:p>
-          <a:p>
-            <a:r>
-              <a:rPr lang="en-GB" dirty="0" smtClean="0"/>
-              <a:t>Android </a:t>
-            </a:r>
-            <a:r>
-              <a:rPr lang="en-GB" dirty="0" smtClean="0"/>
-              <a:t>API- </a:t>
-            </a:r>
-            <a:r>
-              <a:rPr lang="en-GB" dirty="0" smtClean="0"/>
-              <a:t>whatever method is and features that </a:t>
-            </a:r>
-            <a:r>
-              <a:rPr lang="en-GB" dirty="0" smtClean="0"/>
-              <a:t>suite our </a:t>
-            </a:r>
-            <a:r>
-              <a:rPr lang="en-GB" dirty="0" smtClean="0"/>
-              <a:t>project.</a:t>
+              <a:t>Android API- whatever method is and features that suite our project.</a:t>
             </a:r>
           </a:p>
           <a:p>
@@ -12070,7 +11990,7 @@
                   <a:schemeClr val="accent4"/>
                 </a:solidFill>
               </a:rPr>
-              <a:t>Week </a:t>
+              <a:t>Week of Feb </a:t>
             </a:r>
             <a:r>
               <a:rPr lang="en-GB" b="1" dirty="0" smtClean="0">
@@ -12078,17 +11998,12 @@
                   <a:schemeClr val="accent4"/>
                 </a:solidFill>
               </a:rPr>
-              <a:t>of Feb 3rd </a:t>
+              <a:t>18th </a:t>
             </a:r>
             <a:r>
               <a:rPr lang="en-GB" dirty="0" smtClean="0"/>
-              <a:t>-   Planning </a:t>
-            </a:r>
-            <a:r>
-              <a:rPr lang="en-GB" dirty="0" smtClean="0"/>
-              <a:t>phase:</a:t>
-            </a:r>
-            <a:endParaRPr lang="en-GB" dirty="0" smtClean="0"/>
+              <a:t>-   Planning phase:</a:t>
+            </a:r>
           </a:p>
           <a:p>
             <a:pPr marL="0" indent="0">
@@ -12100,16 +12015,69 @@
             </a:r>
             <a:r>
               <a:rPr lang="en-GB" dirty="0" smtClean="0"/>
-              <a:t>            </a:t>
+              <a:t>             - </a:t>
             </a:r>
             <a:r>
               <a:rPr lang="en-GB" dirty="0" smtClean="0"/>
+              <a:t>create a simple</a:t>
+            </a:r>
+            <a:r>
+              <a:rPr lang="en-GB" dirty="0" smtClean="0"/>
+              <a:t> specification</a:t>
+            </a:r>
+          </a:p>
+          <a:p>
+            <a:pPr marL="0" indent="0">
+              <a:buNone/>
+            </a:pPr>
+            <a:r>
+              <a:rPr lang="en-GB" dirty="0"/>
               <a:t> </a:t>
             </a:r>
             <a:r>
               <a:rPr lang="en-GB" dirty="0" smtClean="0"/>
-              <a:t>- setup the specification and Use Case diagram</a:t>
-            </a:r>
+              <a:t>             - Create a </a:t>
+            </a:r>
+            <a:r>
+              <a:rPr lang="en-GB" dirty="0" smtClean="0"/>
+              <a:t>Use </a:t>
+            </a:r>
+            <a:r>
+              <a:rPr lang="en-GB" dirty="0" smtClean="0"/>
+              <a:t>Case </a:t>
+            </a:r>
+            <a:r>
+              <a:rPr lang="en-GB" dirty="0" smtClean="0"/>
+              <a:t>diagram</a:t>
+            </a:r>
+          </a:p>
+          <a:p>
+            <a:pPr marL="0" indent="0">
+              <a:buNone/>
+            </a:pPr>
+            <a:r>
+              <a:rPr lang="en-GB" dirty="0"/>
+              <a:t> </a:t>
+            </a:r>
+            <a:r>
+              <a:rPr lang="en-GB" dirty="0" smtClean="0"/>
+              <a:t>             - Create basic Design and navigation process</a:t>
+            </a:r>
+            <a:endParaRPr lang="en-GB" dirty="0" smtClean="0"/>
+          </a:p>
+          <a:p>
+            <a:pPr marL="0" indent="0">
+              <a:buNone/>
+            </a:pPr>
+            <a:r>
+              <a:rPr lang="en-GB" dirty="0"/>
+              <a:t> </a:t>
+            </a:r>
+            <a:r>
+              <a:rPr lang="en-GB" dirty="0" smtClean="0"/>
+              <a:t>             - Create an initial presentation</a:t>
+            </a:r>
+            <a:endParaRPr lang="en-GB" dirty="0" smtClean="0"/>
           </a:p>
           <a:p>
             <a:pPr marL="0" indent="0">
@@ -12135,7 +12103,7 @@
                   <a:schemeClr val="accent4"/>
                 </a:solidFill>
               </a:rPr>
-              <a:t>Week </a:t>
+              <a:t>Week of </a:t>
             </a:r>
             <a:r>
               <a:rPr lang="en-GB" b="1" dirty="0" smtClean="0">
@@ -12143,7 +12111,7 @@
                   <a:schemeClr val="accent4"/>
                 </a:solidFill>
               </a:rPr>
-              <a:t>of Feb 17</a:t>
+              <a:t>March 4</a:t>
             </a:r>
             <a:r>
               <a:rPr lang="en-GB" b="1" baseline="30000" dirty="0" smtClean="0">
@@ -12155,7 +12123,11 @@
             </a:r>
             <a:r>
               <a:rPr lang="en-GB" dirty="0" smtClean="0"/>
-              <a:t> -   Analysis phase: </a:t>
+              <a:t> </a:t>
+            </a:r>
+            <a:r>
+              <a:rPr lang="en-GB" dirty="0" smtClean="0"/>
+              <a:t>-   Analysis phase: </a:t>
             </a:r>
           </a:p>
           <a:p>
@@ -12168,21 +12140,8 @@
             </a:r>
             <a:r>
               <a:rPr lang="en-GB" dirty="0" smtClean="0"/>
-              <a:t>             </a:t>
-            </a:r>
-            <a:r>
-              <a:rPr lang="en-GB" dirty="0" smtClean="0"/>
-              <a:t> </a:t>
-            </a:r>
-            <a:r>
-              <a:rPr lang="en-GB" dirty="0" smtClean="0"/>
-              <a:t>- Re-visiting the </a:t>
-            </a:r>
-            <a:r>
-              <a:rPr lang="en-GB" dirty="0" smtClean="0"/>
-              <a:t>specification</a:t>
-            </a:r>
-            <a:endParaRPr lang="en-GB" dirty="0" smtClean="0"/>
+              <a:t>              - Re-visiting the specification</a:t>
+            </a:r>
           </a:p>
           <a:p>
             <a:pPr marL="0" indent="0">
@@ -12194,15 +12153,15 @@
             </a:r>
             <a:r>
               <a:rPr lang="en-GB" dirty="0" smtClean="0"/>
-              <a:t>              </a:t>
+              <a:t>              -  </a:t>
             </a:r>
             <a:r>
               <a:rPr lang="en-GB" dirty="0" smtClean="0"/>
-              <a:t>-  </a:t>
+              <a:t>Determine </a:t>
             </a:r>
             <a:r>
               <a:rPr lang="en-GB" dirty="0" smtClean="0"/>
-              <a:t>determine the classes, methods and variable</a:t>
+              <a:t>the classes, methods and variable</a:t>
             </a:r>
           </a:p>
           <a:p>
@@ -12215,15 +12174,23 @@
             </a:r>
             <a:r>
               <a:rPr lang="en-GB" dirty="0" smtClean="0"/>
-              <a:t>              </a:t>
+              <a:t>               - </a:t>
             </a:r>
             <a:r>
               <a:rPr lang="en-GB" dirty="0" smtClean="0"/>
-              <a:t> - </a:t>
+              <a:t>Creat</a:t>
             </a:r>
             <a:r>
               <a:rPr lang="en-GB" dirty="0" smtClean="0"/>
-              <a:t>Activity diagram</a:t>
+              <a:t>e a</a:t>
+            </a:r>
+            <a:r>
+              <a:rPr lang="en-GB" dirty="0" smtClean="0"/>
+              <a:t>ctivity </a:t>
+            </a:r>
+            <a:r>
+              <a:rPr lang="en-GB" dirty="0" smtClean="0"/>
+              <a:t>diagram</a:t>
             </a:r>
           </a:p>
           <a:p>
@@ -12321,7 +12288,7 @@
         </p:spPr>
         <p:txBody>
           <a:bodyPr>
-            <a:normAutofit fontScale="85000" lnSpcReduction="10000"/>
+            <a:normAutofit/>
           </a:bodyPr>
           <a:lstStyle/>
           <a:p>
@@ -12338,7 +12305,7 @@
               <a:buNone/>
             </a:pPr>
             <a:r>
-              <a:rPr lang="en-GB" b="1" dirty="0">
+              <a:rPr lang="en-GB" sz="1900" b="1">
                 <a:solidFill>
                   <a:schemeClr val="accent4"/>
                 </a:solidFill>
@@ -12346,15 +12313,23 @@
               <a:t> </a:t>
             </a:r>
             <a:r>
-              <a:rPr lang="en-GB" b="1" dirty="0" smtClean="0">
+              <a:rPr lang="en-GB" sz="1900" b="1" smtClean="0">
                 <a:solidFill>
                   <a:schemeClr val="accent4"/>
                 </a:solidFill>
               </a:rPr>
-              <a:t>       </a:t>
-            </a:r>
-            <a:r>
-              <a:rPr lang="en-GB" b="1" dirty="0" smtClean="0">
+              <a:t>   </a:t>
+            </a:r>
+            <a:r>
+              <a:rPr lang="en-GB" sz="1900" b="1" smtClean="0">
+                <a:solidFill>
+                  <a:schemeClr val="accent4"/>
+                </a:solidFill>
+              </a:rPr>
+              <a:t>     </a:t>
+            </a:r>
+            <a:r>
+              <a:rPr lang="en-GB" sz="1800" b="1" smtClean="0">
                 <a:solidFill>
                   <a:schemeClr val="accent4"/>
                 </a:solidFill>
@@ -12362,7 +12337,7 @@
               <a:t>Week </a:t>
             </a:r>
             <a:r>
-              <a:rPr lang="en-GB" b="1" dirty="0">
+              <a:rPr lang="en-GB" sz="1800" b="1" dirty="0">
                 <a:solidFill>
                   <a:schemeClr val="accent4"/>
                 </a:solidFill>
@@ -12370,76 +12345,244 @@
               <a:t>of March </a:t>
             </a:r>
             <a:r>
-              <a:rPr lang="en-GB" b="1" dirty="0" smtClean="0">
+              <a:rPr lang="en-GB" sz="1800" b="1" dirty="0" smtClean="0">
                 <a:solidFill>
                   <a:schemeClr val="accent4"/>
                 </a:solidFill>
               </a:rPr>
-              <a:t>3rd </a:t>
-            </a:r>
-            <a:r>
-              <a:rPr lang="en-GB" dirty="0"/>
-              <a:t>– pre implementation </a:t>
-            </a:r>
-            <a:r>
-              <a:rPr lang="en-GB" dirty="0" smtClean="0"/>
-              <a:t>phase:</a:t>
-            </a:r>
-            <a:endParaRPr lang="en-GB" dirty="0"/>
-          </a:p>
-          <a:p>
-            <a:pPr marL="0" indent="0">
-              <a:buNone/>
-            </a:pPr>
-            <a:r>
-              <a:rPr lang="en-GB" dirty="0"/>
-              <a:t>                </a:t>
-            </a:r>
-            <a:r>
-              <a:rPr lang="en-GB" dirty="0" smtClean="0"/>
-              <a:t>- </a:t>
-            </a:r>
-            <a:r>
-              <a:rPr lang="en-GB" dirty="0" smtClean="0"/>
-              <a:t>working on project pseudo code and </a:t>
-            </a:r>
-          </a:p>
-          <a:p>
-            <a:pPr marL="0" indent="0">
-              <a:buNone/>
-            </a:pPr>
-            <a:endParaRPr lang="en-GB" dirty="0" smtClean="0"/>
-          </a:p>
-          <a:p>
-            <a:pPr marL="0" indent="0">
-              <a:buNone/>
-            </a:pPr>
-            <a:r>
-              <a:rPr lang="en-GB" dirty="0"/>
-              <a:t> </a:t>
-            </a:r>
-            <a:r>
-              <a:rPr lang="en-GB" dirty="0" smtClean="0"/>
-              <a:t>       </a:t>
-            </a:r>
-            <a:r>
-              <a:rPr lang="en-GB" b="1" dirty="0" smtClean="0">
+              <a:t>18th</a:t>
+            </a:r>
+            <a:r>
+              <a:rPr lang="en-GB" sz="1800" b="1" dirty="0" smtClean="0">
                 <a:solidFill>
                   <a:schemeClr val="accent4"/>
                 </a:solidFill>
               </a:rPr>
-              <a:t>Week </a:t>
-            </a:r>
-            <a:r>
-              <a:rPr lang="en-GB" b="1" dirty="0" smtClean="0">
+              <a:t> </a:t>
+            </a:r>
+            <a:r>
+              <a:rPr lang="en-GB" sz="1800" dirty="0"/>
+              <a:t>– pre implementation </a:t>
+            </a:r>
+            <a:r>
+              <a:rPr lang="en-GB" sz="1800" dirty="0" smtClean="0"/>
+              <a:t>phase:</a:t>
+            </a:r>
+            <a:endParaRPr lang="en-GB" sz="1800" dirty="0"/>
+          </a:p>
+          <a:p>
+            <a:pPr marL="0" indent="0">
+              <a:buNone/>
+            </a:pPr>
+            <a:r>
+              <a:rPr lang="en-GB" sz="1800" dirty="0"/>
+              <a:t>                </a:t>
+            </a:r>
+            <a:r>
+              <a:rPr lang="en-GB" sz="1800" dirty="0" smtClean="0"/>
+              <a:t>- </a:t>
+            </a:r>
+            <a:r>
+              <a:rPr lang="en-GB" sz="1800" dirty="0" smtClean="0"/>
+              <a:t>forming the </a:t>
+            </a:r>
+            <a:r>
+              <a:rPr lang="en-GB" sz="1800" dirty="0" smtClean="0"/>
+              <a:t>project pseudo code </a:t>
+            </a:r>
+            <a:r>
+              <a:rPr lang="en-GB" sz="1800" dirty="0" smtClean="0"/>
+              <a:t> </a:t>
+            </a:r>
+            <a:endParaRPr lang="en-GB" sz="1800" dirty="0" smtClean="0"/>
+          </a:p>
+          <a:p>
+            <a:pPr marL="0" indent="0">
+              <a:buNone/>
+            </a:pPr>
+            <a:endParaRPr lang="en-GB" dirty="0" smtClean="0"/>
+          </a:p>
+          <a:p>
+            <a:pPr marL="0" indent="0">
+              <a:buNone/>
+            </a:pPr>
+            <a:r>
+              <a:rPr lang="en-GB" dirty="0"/>
+              <a:t> </a:t>
+            </a:r>
+            <a:r>
+              <a:rPr lang="en-GB" dirty="0" smtClean="0"/>
+              <a:t>       </a:t>
+            </a:r>
+            <a:r>
+              <a:rPr lang="en-GB" sz="1900" b="1" dirty="0" smtClean="0">
                 <a:solidFill>
                   <a:schemeClr val="accent4"/>
                 </a:solidFill>
               </a:rPr>
-              <a:t>of March  17</a:t>
-            </a:r>
-            <a:r>
-              <a:rPr lang="en-GB" b="1" baseline="30000" dirty="0" smtClean="0">
+              <a:t>Week of </a:t>
+            </a:r>
+            <a:r>
+              <a:rPr lang="en-GB" sz="1900" b="1" dirty="0" smtClean="0">
+                <a:solidFill>
+                  <a:schemeClr val="accent4"/>
+                </a:solidFill>
+              </a:rPr>
+              <a:t>April 1st</a:t>
+            </a:r>
+            <a:r>
+              <a:rPr lang="en-GB" sz="1900" b="1" dirty="0" smtClean="0">
+                <a:solidFill>
+                  <a:schemeClr val="accent4"/>
+                </a:solidFill>
+              </a:rPr>
+              <a:t> </a:t>
+            </a:r>
+            <a:r>
+              <a:rPr lang="en-GB" sz="1900" dirty="0" smtClean="0"/>
+              <a:t>– implementation phase:</a:t>
+            </a:r>
+          </a:p>
+          <a:p>
+            <a:pPr marL="0" indent="0">
+              <a:buNone/>
+            </a:pPr>
+            <a:r>
+              <a:rPr lang="en-GB" sz="1900" dirty="0"/>
+              <a:t> </a:t>
+            </a:r>
+            <a:r>
+              <a:rPr lang="en-GB" sz="1900" dirty="0" smtClean="0"/>
+              <a:t>               - coding and unit testing </a:t>
+            </a:r>
+          </a:p>
+          <a:p>
+            <a:pPr marL="0" indent="0">
+              <a:buNone/>
+            </a:pPr>
+            <a:endParaRPr lang="en-GB" sz="1900" dirty="0" smtClean="0"/>
+          </a:p>
+          <a:p>
+            <a:pPr marL="0" indent="0">
+              <a:buNone/>
+            </a:pPr>
+            <a:r>
+              <a:rPr lang="en-GB" sz="1900" dirty="0"/>
+              <a:t> </a:t>
+            </a:r>
+            <a:r>
+              <a:rPr lang="en-GB" sz="1900" dirty="0" smtClean="0"/>
+              <a:t>       </a:t>
+            </a:r>
+            <a:r>
+              <a:rPr lang="en-GB" sz="1900" b="1" dirty="0" smtClean="0">
+                <a:solidFill>
+                  <a:schemeClr val="accent4"/>
+                </a:solidFill>
+              </a:rPr>
+              <a:t>Week of </a:t>
+            </a:r>
+            <a:r>
+              <a:rPr lang="en-GB" sz="1900" b="1" dirty="0" smtClean="0">
+                <a:solidFill>
+                  <a:schemeClr val="accent4"/>
+                </a:solidFill>
+              </a:rPr>
+              <a:t>April</a:t>
+            </a:r>
+            <a:r>
+              <a:rPr lang="en-GB" sz="1900" b="1" dirty="0" smtClean="0">
+                <a:solidFill>
+                  <a:schemeClr val="accent4"/>
+                </a:solidFill>
+              </a:rPr>
+              <a:t> 15th </a:t>
+            </a:r>
+            <a:r>
+              <a:rPr lang="en-GB" sz="1900" b="1" dirty="0" smtClean="0">
+                <a:solidFill>
+                  <a:schemeClr val="accent4"/>
+                </a:solidFill>
+              </a:rPr>
+              <a:t>– </a:t>
+            </a:r>
+            <a:r>
+              <a:rPr lang="en-GB" sz="1900" dirty="0" smtClean="0"/>
+              <a:t>Source Code:</a:t>
+            </a:r>
+            <a:endParaRPr lang="en-GB" sz="1900" b="1" dirty="0" smtClean="0">
+              <a:solidFill>
+                <a:schemeClr val="accent4"/>
+              </a:solidFill>
+            </a:endParaRPr>
+          </a:p>
+          <a:p>
+            <a:pPr marL="0" indent="0">
+              <a:buNone/>
+            </a:pPr>
+            <a:r>
+              <a:rPr lang="en-GB" sz="1900" dirty="0"/>
+              <a:t> </a:t>
+            </a:r>
+            <a:r>
+              <a:rPr lang="en-GB" sz="1900" dirty="0" smtClean="0"/>
+              <a:t>                 - units integration and </a:t>
+            </a:r>
+            <a:r>
+              <a:rPr lang="en-GB" sz="1900" dirty="0" smtClean="0"/>
+              <a:t>testing</a:t>
+            </a:r>
+            <a:endParaRPr lang="en-GB" sz="1900" b="1" u="sng" dirty="0" smtClean="0">
+              <a:solidFill>
+                <a:schemeClr val="accent4"/>
+              </a:solidFill>
+            </a:endParaRPr>
+          </a:p>
+          <a:p>
+            <a:pPr marL="0" indent="0">
+              <a:buNone/>
+            </a:pPr>
+            <a:r>
+              <a:rPr lang="en-GB" sz="1900" dirty="0" smtClean="0"/>
+              <a:t>                  - Submitting the source code to professor</a:t>
+            </a:r>
+          </a:p>
+          <a:p>
+            <a:pPr marL="0" indent="0">
+              <a:buNone/>
+            </a:pPr>
+            <a:endParaRPr lang="en-GB" sz="1900" dirty="0" smtClean="0"/>
+          </a:p>
+          <a:p>
+            <a:pPr marL="0" indent="0">
+              <a:buNone/>
+            </a:pPr>
+            <a:r>
+              <a:rPr lang="en-GB" sz="1900" dirty="0"/>
+              <a:t> </a:t>
+            </a:r>
+            <a:r>
+              <a:rPr lang="en-GB" sz="1900" dirty="0" smtClean="0"/>
+              <a:t>          </a:t>
+            </a:r>
+            <a:r>
+              <a:rPr lang="en-GB" sz="1900" b="1" dirty="0" smtClean="0">
+                <a:solidFill>
+                  <a:schemeClr val="accent4"/>
+                </a:solidFill>
+              </a:rPr>
+              <a:t>Week of April </a:t>
+            </a:r>
+            <a:r>
+              <a:rPr lang="en-GB" sz="1900" b="1" dirty="0" smtClean="0">
+                <a:solidFill>
+                  <a:schemeClr val="accent4"/>
+                </a:solidFill>
+              </a:rPr>
+              <a:t>29</a:t>
+            </a:r>
+            <a:r>
+              <a:rPr lang="en-GB" sz="1900" b="1" baseline="30000" dirty="0" smtClean="0">
                 <a:solidFill>
                   <a:schemeClr val="accent4"/>
                 </a:solidFill>
@@ -12447,7 +12590,7 @@
               <a:t>th</a:t>
             </a:r>
             <a:r>
-              <a:rPr lang="en-GB" b="1" dirty="0" smtClean="0">
+              <a:rPr lang="en-GB" sz="1900" b="1" dirty="0" smtClean="0">
                 <a:solidFill>
                   <a:schemeClr val="accent4"/>
                 </a:solidFill>
@@ -12455,265 +12598,17 @@
               <a:t> </a:t>
             </a:r>
             <a:r>
-              <a:rPr lang="en-GB" dirty="0" smtClean="0"/>
-              <a:t>– implementation </a:t>
-            </a:r>
-            <a:r>
-              <a:rPr lang="en-GB" dirty="0" smtClean="0"/>
-              <a:t>phase:</a:t>
-            </a:r>
-            <a:endParaRPr lang="en-GB" dirty="0" smtClean="0"/>
+              <a:rPr lang="en-GB" sz="1900" dirty="0" smtClean="0"/>
+              <a:t>– Class presentation:</a:t>
+            </a:r>
           </a:p>
           <a:p>
             <a:pPr marL="0" indent="0">
               <a:buNone/>
             </a:pPr>
             <a:r>
-              <a:rPr lang="en-GB" dirty="0"/>
-              <a:t> </a:t>
-            </a:r>
-            <a:r>
-              <a:rPr lang="en-GB" dirty="0" smtClean="0"/>
-              <a:t>               </a:t>
-            </a:r>
-            <a:r>
-              <a:rPr lang="en-GB" dirty="0" smtClean="0"/>
-              <a:t>- </a:t>
-            </a:r>
-            <a:r>
-              <a:rPr lang="en-GB" dirty="0" smtClean="0"/>
-              <a:t>coding and unit testing </a:t>
-            </a:r>
-          </a:p>
-          <a:p>
-            <a:pPr marL="0" indent="0">
-              <a:buNone/>
-            </a:pPr>
-            <a:endParaRPr lang="en-GB" dirty="0" smtClean="0"/>
-          </a:p>
-          <a:p>
-            <a:pPr marL="0" indent="0">
-              <a:buNone/>
-            </a:pPr>
-            <a:r>
-              <a:rPr lang="en-GB" dirty="0"/>
-              <a:t> </a:t>
-            </a:r>
-            <a:r>
-              <a:rPr lang="en-GB" dirty="0" smtClean="0"/>
-              <a:t>       </a:t>
-            </a:r>
-            <a:r>
-              <a:rPr lang="en-GB" b="1" dirty="0" smtClean="0">
-                <a:solidFill>
-                  <a:schemeClr val="accent4"/>
-                </a:solidFill>
-              </a:rPr>
-              <a:t>Week </a:t>
-            </a:r>
-            <a:r>
-              <a:rPr lang="en-GB" b="1" dirty="0" smtClean="0">
-                <a:solidFill>
-                  <a:schemeClr val="accent4"/>
-                </a:solidFill>
-              </a:rPr>
-              <a:t>of March 31</a:t>
-            </a:r>
-            <a:r>
-              <a:rPr lang="en-GB" b="1" baseline="30000" dirty="0" smtClean="0">
-                <a:solidFill>
-                  <a:schemeClr val="accent4"/>
-                </a:solidFill>
-              </a:rPr>
-              <a:t>st</a:t>
-            </a:r>
-            <a:r>
-              <a:rPr lang="en-GB" b="1" dirty="0" smtClean="0">
-                <a:solidFill>
-                  <a:schemeClr val="accent4"/>
-                </a:solidFill>
-              </a:rPr>
-              <a:t>/ April 1st – </a:t>
-            </a:r>
-            <a:r>
-              <a:rPr lang="en-GB" dirty="0" smtClean="0"/>
-              <a:t>program </a:t>
-            </a:r>
-            <a:r>
-              <a:rPr lang="en-GB" dirty="0" smtClean="0"/>
-              <a:t>testing:</a:t>
-            </a:r>
-            <a:endParaRPr lang="en-GB" b="1" dirty="0" smtClean="0">
-              <a:solidFill>
-                <a:schemeClr val="accent4"/>
-              </a:solidFill>
-            </a:endParaRPr>
-          </a:p>
-          <a:p>
-            <a:pPr marL="0" indent="0">
-              <a:buNone/>
-            </a:pPr>
-            <a:r>
-              <a:rPr lang="en-GB" dirty="0"/>
-              <a:t> </a:t>
-            </a:r>
-            <a:r>
-              <a:rPr lang="en-GB" dirty="0" smtClean="0"/>
-              <a:t>                </a:t>
-            </a:r>
-            <a:r>
-              <a:rPr lang="en-GB" dirty="0" smtClean="0"/>
-              <a:t> </a:t>
-            </a:r>
-            <a:r>
-              <a:rPr lang="en-GB" dirty="0" smtClean="0"/>
-              <a:t>- units integration and testing</a:t>
-            </a:r>
-          </a:p>
-          <a:p>
-            <a:pPr marL="0" indent="0">
-              <a:buNone/>
-            </a:pPr>
-            <a:endParaRPr lang="en-GB" dirty="0" smtClean="0"/>
-          </a:p>
-          <a:p>
-            <a:pPr marL="0" indent="0">
-              <a:buNone/>
-            </a:pPr>
-            <a:r>
-              <a:rPr lang="en-GB" dirty="0"/>
-              <a:t> </a:t>
-            </a:r>
-            <a:r>
-              <a:rPr lang="en-GB" dirty="0" smtClean="0"/>
-              <a:t>         </a:t>
-            </a:r>
-            <a:r>
-              <a:rPr lang="en-GB" b="1" dirty="0" smtClean="0">
-                <a:solidFill>
-                  <a:schemeClr val="accent4"/>
-                </a:solidFill>
-              </a:rPr>
-              <a:t>Week </a:t>
-            </a:r>
-            <a:r>
-              <a:rPr lang="en-GB" b="1" dirty="0" smtClean="0">
-                <a:solidFill>
-                  <a:schemeClr val="accent4"/>
-                </a:solidFill>
-              </a:rPr>
-              <a:t>of April 14th –</a:t>
-            </a:r>
-            <a:r>
-              <a:rPr lang="en-GB" dirty="0" smtClean="0">
-                <a:solidFill>
-                  <a:schemeClr val="accent4"/>
-                </a:solidFill>
-              </a:rPr>
-              <a:t> </a:t>
-            </a:r>
-            <a:r>
-              <a:rPr lang="en-GB" dirty="0" smtClean="0"/>
-              <a:t>Source codes</a:t>
-            </a:r>
-            <a:endParaRPr lang="en-GB" b="1" u="sng" dirty="0" smtClean="0">
-              <a:solidFill>
-                <a:schemeClr val="accent4"/>
-              </a:solidFill>
-            </a:endParaRPr>
-          </a:p>
-          <a:p>
-            <a:pPr marL="0" indent="0">
-              <a:buNone/>
-            </a:pPr>
-            <a:r>
-              <a:rPr lang="en-GB" dirty="0" smtClean="0"/>
-              <a:t>                  </a:t>
-            </a:r>
-            <a:r>
-              <a:rPr lang="en-GB" dirty="0" smtClean="0"/>
-              <a:t>- </a:t>
-            </a:r>
-            <a:r>
-              <a:rPr lang="en-GB" dirty="0" smtClean="0"/>
-              <a:t>Submitting the source code to professor</a:t>
-            </a:r>
-          </a:p>
-          <a:p>
-            <a:pPr marL="0" indent="0">
-              <a:buNone/>
-            </a:pPr>
-            <a:endParaRPr lang="en-GB" dirty="0" smtClean="0"/>
-          </a:p>
-          <a:p>
-            <a:pPr marL="0" indent="0">
-              <a:buNone/>
-            </a:pPr>
-            <a:r>
-              <a:rPr lang="en-GB" dirty="0"/>
-              <a:t> </a:t>
-            </a:r>
-            <a:r>
-              <a:rPr lang="en-GB" dirty="0" smtClean="0"/>
-              <a:t>          </a:t>
-            </a:r>
-            <a:r>
-              <a:rPr lang="en-GB" b="1" dirty="0" smtClean="0">
-                <a:solidFill>
-                  <a:schemeClr val="accent4"/>
-                </a:solidFill>
-              </a:rPr>
-              <a:t>Week </a:t>
-            </a:r>
-            <a:r>
-              <a:rPr lang="en-GB" b="1" dirty="0" smtClean="0">
-                <a:solidFill>
-                  <a:schemeClr val="accent4"/>
-                </a:solidFill>
-              </a:rPr>
-              <a:t>of April 28</a:t>
-            </a:r>
-            <a:r>
-              <a:rPr lang="en-GB" b="1" baseline="30000" dirty="0" smtClean="0">
-                <a:solidFill>
-                  <a:schemeClr val="accent4"/>
-                </a:solidFill>
-              </a:rPr>
-              <a:t>th</a:t>
-            </a:r>
-            <a:r>
-              <a:rPr lang="en-GB" b="1" dirty="0" smtClean="0">
-                <a:solidFill>
-                  <a:schemeClr val="accent4"/>
-                </a:solidFill>
-              </a:rPr>
-              <a:t> </a:t>
-            </a:r>
-            <a:r>
-              <a:rPr lang="en-GB" dirty="0" smtClean="0"/>
-              <a:t>– Class </a:t>
-            </a:r>
-            <a:r>
-              <a:rPr lang="en-GB" dirty="0" smtClean="0"/>
-              <a:t>presentation:</a:t>
-            </a:r>
-            <a:endParaRPr lang="en-GB" dirty="0" smtClean="0"/>
-          </a:p>
-          <a:p>
-            <a:pPr marL="0" indent="0">
-              <a:buNone/>
-            </a:pPr>
-            <a:r>
-              <a:rPr lang="en-GB" dirty="0" smtClean="0"/>
-              <a:t>                   </a:t>
-            </a:r>
-            <a:r>
-              <a:rPr lang="en-GB" dirty="0" smtClean="0"/>
-              <a:t> </a:t>
-            </a:r>
-            <a:r>
-              <a:rPr lang="en-GB" dirty="0" smtClean="0"/>
-              <a:t>-Presenting the program in class</a:t>
+              <a:rPr lang="en-GB" sz="1900" dirty="0" smtClean="0"/>
+              <a:t>                    -Presenting the program in class</a:t>
             </a:r>
           </a:p>
           <a:p>
@@ -12816,7 +12711,7 @@
         </p:spPr>
         <p:txBody>
           <a:bodyPr>
-            <a:normAutofit fontScale="92500" lnSpcReduction="20000"/>
+            <a:normAutofit fontScale="85000" lnSpcReduction="10000"/>
           </a:bodyPr>
           <a:lstStyle/>
           <a:p>
@@ -12861,24 +12756,35 @@
             </a:r>
           </a:p>
           <a:p>
-            <a:endParaRPr lang="en-GB" dirty="0"/>
-          </a:p>
-          <a:p>
             <a:pPr marL="0" indent="0">
               <a:buNone/>
             </a:pPr>
             <a:r>
               <a:rPr lang="en-GB" dirty="0" smtClean="0"/>
-              <a:t>A person playing the game would use the screen  touch to move the dog as needed. The dog would move </a:t>
+              <a:t>A </a:t>
             </a:r>
             <a:r>
               <a:rPr lang="en-GB" dirty="0" smtClean="0"/>
-              <a:t>to restrict </a:t>
+              <a:t>person playing the game would use the screen  touch to move the dog as needed. The dog would move to restrict the sheep movement and keep them together. The dog would also move toward an incoming fox to chase him away from </a:t>
             </a:r>
             <a:r>
               <a:rPr lang="en-GB" dirty="0" smtClean="0"/>
-              <a:t>the sheep movement and keep them together. The dog would also move toward an incoming fox to chase him away from sheep.</a:t>
-            </a:r>
+              <a:t>sheep.</a:t>
+            </a:r>
+          </a:p>
+          <a:p>
+            <a:pPr marL="0" indent="0">
+              <a:buNone/>
+            </a:pPr>
+            <a:r>
+              <a:rPr lang="en-GB" dirty="0"/>
+              <a:t>A</a:t>
+            </a:r>
+            <a:r>
+              <a:rPr lang="en-GB" dirty="0" smtClean="0"/>
+              <a:t>ttached use case and activity diagram explains the navigation process.</a:t>
+            </a:r>
+            <a:endParaRPr lang="en-GB" dirty="0" smtClean="0"/>
           </a:p>
         </p:txBody>
       </p:sp>
@@ -13025,23 +12931,7 @@
                   <a:srgbClr val="FF0000"/>
                 </a:solidFill>
               </a:rPr>
-              <a:t> </a:t>
-            </a:r>
-            <a:r>
-              <a:rPr lang="en-GB" sz="2400" b="1" dirty="0" smtClean="0">
-                <a:solidFill>
-                  <a:srgbClr val="FF0000"/>
-                </a:solidFill>
-              </a:rPr>
-              <a:t>                       Thank </a:t>
-            </a:r>
-            <a:r>
-              <a:rPr lang="en-GB" sz="2400" b="1" dirty="0" smtClean="0">
-                <a:solidFill>
-                  <a:srgbClr val="FF0000"/>
-                </a:solidFill>
-              </a:rPr>
-              <a:t>you all for listening!!</a:t>
+              <a:t>                        Thank you all for listening!!</a:t>
             </a:r>
             <a:endParaRPr lang="en-GB" sz="2400" b="1" dirty="0">
               <a:solidFill>

</xml_diff>

<commit_message>
Adding title to main page
New version of the initial presentation
</commit_message>
<xml_diff>
--- a/Initial_presentation/Initial presentation.pptx
+++ b/Initial_presentation/Initial presentation.pptx
@@ -121,25 +121,13 @@
 
 <file path=ppt/charts/chart1.xml><?xml version="1.0" encoding="utf-8"?>
 <c:chartSpace xmlns:c="http://schemas.openxmlformats.org/drawingml/2006/chart" xmlns:a="http://schemas.openxmlformats.org/drawingml/2006/main" xmlns:r="http://schemas.openxmlformats.org/officeDocument/2006/relationships">
-  <c:date1904 val="0"/>
   <c:lang val="en-US"/>
-  <c:roundedCorners val="0"/>
-  <mc:AlternateContent xmlns:mc="http://schemas.openxmlformats.org/markup-compatibility/2006">
-    <mc:Choice xmlns:c14="http://schemas.microsoft.com/office/drawing/2007/8/2/chart" Requires="c14">
-      <c14:style val="102"/>
-    </mc:Choice>
-    <mc:Fallback>
-      <c:style val="2"/>
-    </mc:Fallback>
-  </mc:AlternateContent>
   <c:chart>
-    <c:autoTitleDeleted val="0"/>
     <c:plotArea>
       <c:layout/>
       <c:barChart>
         <c:barDir val="bar"/>
         <c:grouping val="clustered"/>
-        <c:varyColors val="0"/>
         <c:ser>
           <c:idx val="0"/>
           <c:order val="0"/>
@@ -159,7 +147,6 @@
               <a:schemeClr val="accent1"/>
             </a:solidFill>
           </c:spPr>
-          <c:invertIfNegative val="0"/>
           <c:cat>
             <c:strRef>
               <c:f>Sheet1!$A$2:$A$5</c:f>
@@ -221,7 +208,6 @@
               <a:schemeClr val="accent2"/>
             </a:solidFill>
           </c:spPr>
-          <c:invertIfNegative val="0"/>
           <c:cat>
             <c:strRef>
               <c:f>Sheet1!$A$2:$A$5</c:f>
@@ -283,7 +269,6 @@
               <a:schemeClr val="accent3"/>
             </a:solidFill>
           </c:spPr>
-          <c:invertIfNegative val="0"/>
           <c:cat>
             <c:strRef>
               <c:f>Sheet1!$A$2:$A$5</c:f>
@@ -345,7 +330,6 @@
               <a:schemeClr val="accent4"/>
             </a:solidFill>
           </c:spPr>
-          <c:invertIfNegative val="0"/>
           <c:cat>
             <c:strRef>
               <c:f>Sheet1!$A$2:$A$5</c:f>
@@ -388,44 +372,32 @@
             </c:numRef>
           </c:val>
         </c:ser>
-        <c:dLbls>
-          <c:showLegendKey val="0"/>
-          <c:showVal val="0"/>
-          <c:showCatName val="0"/>
-          <c:showSerName val="0"/>
-          <c:showPercent val="0"/>
-          <c:showBubbleSize val="0"/>
-        </c:dLbls>
-        <c:gapWidth val="150"/>
-        <c:axId val="119806976"/>
-        <c:axId val="119808768"/>
+        <c:dLbls/>
+        <c:axId val="50539904"/>
+        <c:axId val="50558080"/>
       </c:barChart>
       <c:catAx>
-        <c:axId val="119806976"/>
+        <c:axId val="50539904"/>
         <c:scaling>
           <c:orientation val="minMax"/>
         </c:scaling>
-        <c:delete val="0"/>
         <c:axPos val="l"/>
         <c:majorTickMark val="none"/>
-        <c:minorTickMark val="none"/>
         <c:tickLblPos val="nextTo"/>
         <c:spPr>
           <a:ln w="6350"/>
         </c:spPr>
-        <c:crossAx val="119808768"/>
+        <c:crossAx val="50558080"/>
         <c:crosses val="autoZero"/>
         <c:auto val="1"/>
         <c:lblAlgn val="ctr"/>
         <c:lblOffset val="100"/>
-        <c:noMultiLvlLbl val="0"/>
       </c:catAx>
       <c:valAx>
-        <c:axId val="119808768"/>
+        <c:axId val="50558080"/>
         <c:scaling>
           <c:orientation val="minMax"/>
         </c:scaling>
-        <c:delete val="0"/>
         <c:axPos val="b"/>
         <c:majorGridlines>
           <c:spPr>
@@ -438,14 +410,13 @@
         </c:majorGridlines>
         <c:numFmt formatCode="General" sourceLinked="1"/>
         <c:majorTickMark val="in"/>
-        <c:minorTickMark val="none"/>
         <c:tickLblPos val="nextTo"/>
         <c:spPr>
           <a:ln w="6350">
             <a:noFill/>
           </a:ln>
         </c:spPr>
-        <c:crossAx val="119806976"/>
+        <c:crossAx val="50539904"/>
         <c:crosses val="autoZero"/>
         <c:crossBetween val="between"/>
       </c:valAx>
@@ -458,7 +429,6 @@
     </c:plotArea>
     <c:legend>
       <c:legendPos val="t"/>
-      <c:overlay val="0"/>
       <c:spPr>
         <a:ln>
           <a:noFill/>
@@ -467,7 +437,6 @@
     </c:legend>
     <c:plotVisOnly val="1"/>
     <c:dispBlanksAs val="gap"/>
-    <c:showDLblsOverMax val="0"/>
   </c:chart>
   <c:spPr>
     <a:ln>
@@ -487,29 +456,16 @@
       <a:endParaRPr lang="en-US"/>
     </a:p>
   </c:txPr>
-  <c:externalData r:id="rId1">
-    <c:autoUpdate val="0"/>
-  </c:externalData>
+  <c:externalData r:id="rId1"/>
 </c:chartSpace>
 </file>
 
 <file path=ppt/charts/chart2.xml><?xml version="1.0" encoding="utf-8"?>
 <c:chartSpace xmlns:c="http://schemas.openxmlformats.org/drawingml/2006/chart" xmlns:a="http://schemas.openxmlformats.org/drawingml/2006/main" xmlns:r="http://schemas.openxmlformats.org/officeDocument/2006/relationships">
-  <c:date1904 val="0"/>
   <c:lang val="en-US"/>
-  <c:roundedCorners val="0"/>
-  <mc:AlternateContent xmlns:mc="http://schemas.openxmlformats.org/markup-compatibility/2006">
-    <mc:Choice xmlns:c14="http://schemas.microsoft.com/office/drawing/2007/8/2/chart" Requires="c14">
-      <c14:style val="102"/>
-    </mc:Choice>
-    <mc:Fallback>
-      <c:style val="2"/>
-    </mc:Fallback>
-  </mc:AlternateContent>
   <c:clrMapOvr bg1="lt1" tx1="dk1" bg2="lt2" tx2="dk2" accent1="accent1" accent2="accent2" accent3="accent3" accent4="accent4" accent5="accent5" accent6="accent6" hlink="hlink" folHlink="folHlink"/>
   <c:chart>
     <c:title>
-      <c:overlay val="0"/>
       <c:txPr>
         <a:bodyPr/>
         <a:lstStyle/>
@@ -521,7 +477,6 @@
         </a:p>
       </c:txPr>
     </c:title>
-    <c:autoTitleDeleted val="0"/>
     <c:plotArea>
       <c:layout/>
       <c:pieChart>
@@ -547,7 +502,6 @@
           </c:spPr>
           <c:dPt>
             <c:idx val="0"/>
-            <c:bubble3D val="0"/>
             <c:spPr>
               <a:solidFill>
                 <a:srgbClr val="990033"/>
@@ -556,7 +510,6 @@
           </c:dPt>
           <c:dPt>
             <c:idx val="1"/>
-            <c:bubble3D val="0"/>
             <c:spPr>
               <a:solidFill>
                 <a:srgbClr val="99CC00"/>
@@ -565,7 +518,6 @@
           </c:dPt>
           <c:dPt>
             <c:idx val="2"/>
-            <c:bubble3D val="0"/>
             <c:spPr>
               <a:solidFill>
                 <a:srgbClr val="009999"/>
@@ -574,7 +526,6 @@
           </c:dPt>
           <c:dPt>
             <c:idx val="3"/>
-            <c:bubble3D val="0"/>
             <c:spPr>
               <a:solidFill>
                 <a:srgbClr val="3366CC"/>
@@ -745,15 +696,7 @@
             </c:numRef>
           </c:val>
         </c:ser>
-        <c:dLbls>
-          <c:showLegendKey val="0"/>
-          <c:showVal val="0"/>
-          <c:showCatName val="0"/>
-          <c:showSerName val="0"/>
-          <c:showPercent val="0"/>
-          <c:showBubbleSize val="0"/>
-          <c:showLeaderLines val="0"/>
-        </c:dLbls>
+        <c:dLbls/>
         <c:firstSliceAng val="0"/>
       </c:pieChart>
       <c:spPr>
@@ -765,7 +708,6 @@
     </c:plotArea>
     <c:legend>
       <c:legendPos val="t"/>
-      <c:overlay val="0"/>
       <c:spPr>
         <a:ln>
           <a:noFill/>
@@ -774,7 +716,6 @@
     </c:legend>
     <c:plotVisOnly val="1"/>
     <c:dispBlanksAs val="zero"/>
-    <c:showDLblsOverMax val="0"/>
   </c:chart>
   <c:spPr>
     <a:ln>
@@ -794,9 +735,7 @@
       <a:endParaRPr lang="en-US"/>
     </a:p>
   </c:txPr>
-  <c:externalData r:id="rId2">
-    <c:autoUpdate val="0"/>
-  </c:externalData>
+  <c:externalData r:id="rId2"/>
 </c:chartSpace>
 </file>
 
@@ -889,7 +828,7 @@
                 <a:cs typeface="Arial" pitchFamily="34" charset="0"/>
               </a:rPr>
               <a:pPr/>
-              <a:t>09/02/2014</a:t>
+              <a:t>11/02/2014</a:t>
             </a:fld>
             <a:endParaRPr lang="en-GB" sz="800" dirty="0">
               <a:latin typeface="Arial" pitchFamily="34" charset="0"/>
@@ -998,7 +937,7 @@
     </p:spTree>
     <p:extLst>
       <p:ext uri="{BB962C8B-B14F-4D97-AF65-F5344CB8AC3E}">
-        <p14:creationId xmlns:p14="http://schemas.microsoft.com/office/powerpoint/2010/main" val="3319920937"/>
+        <p14:creationId xmlns:p14="http://schemas.microsoft.com/office/powerpoint/2010/main" xmlns="" val="3319920937"/>
       </p:ext>
     </p:extLst>
   </p:cSld>
@@ -1095,7 +1034,7 @@
             <a:fld id="{FA175E2C-59E1-4EF1-A36A-FD7E50E71E80}" type="datetimeFigureOut">
               <a:rPr lang="en-GB" smtClean="0"/>
               <a:pPr/>
-              <a:t>09/02/2014</a:t>
+              <a:t>11/02/2014</a:t>
             </a:fld>
             <a:endParaRPr lang="en-GB" dirty="0"/>
           </a:p>
@@ -1274,7 +1213,7 @@
     </p:spTree>
     <p:extLst>
       <p:ext uri="{BB962C8B-B14F-4D97-AF65-F5344CB8AC3E}">
-        <p14:creationId xmlns:p14="http://schemas.microsoft.com/office/powerpoint/2010/main" val="2500505524"/>
+        <p14:creationId xmlns:p14="http://schemas.microsoft.com/office/powerpoint/2010/main" xmlns="" val="2500505524"/>
       </p:ext>
     </p:extLst>
   </p:cSld>
@@ -1461,7 +1400,7 @@
     </p:spTree>
     <p:extLst>
       <p:ext uri="{BB962C8B-B14F-4D97-AF65-F5344CB8AC3E}">
-        <p14:creationId xmlns:p14="http://schemas.microsoft.com/office/powerpoint/2010/main" val="2376658476"/>
+        <p14:creationId xmlns:p14="http://schemas.microsoft.com/office/powerpoint/2010/main" xmlns="" val="2376658476"/>
       </p:ext>
     </p:extLst>
   </p:cSld>
@@ -2066,7 +2005,7 @@
             <a:fld id="{9D21D778-B565-4D7E-94D7-64010A445B68}" type="datetimeFigureOut">
               <a:rPr lang="en-US" smtClean="0"/>
               <a:pPr eaLnBrk="1" latinLnBrk="0" hangingPunct="1"/>
-              <a:t>2/9/2014</a:t>
+              <a:t>2/11/2014</a:t>
             </a:fld>
             <a:endParaRPr lang="en-US"/>
           </a:p>
@@ -2603,7 +2542,7 @@
             <a:fld id="{9D21D778-B565-4D7E-94D7-64010A445B68}" type="datetimeFigureOut">
               <a:rPr lang="en-US" smtClean="0"/>
               <a:pPr eaLnBrk="1" latinLnBrk="0" hangingPunct="1"/>
-              <a:t>2/9/2014</a:t>
+              <a:t>2/11/2014</a:t>
             </a:fld>
             <a:endParaRPr lang="en-US"/>
           </a:p>
@@ -2929,7 +2868,7 @@
             <a:fld id="{9D21D778-B565-4D7E-94D7-64010A445B68}" type="datetimeFigureOut">
               <a:rPr lang="en-US" smtClean="0"/>
               <a:pPr eaLnBrk="1" latinLnBrk="0" hangingPunct="1"/>
-              <a:t>2/9/2014</a:t>
+              <a:t>2/11/2014</a:t>
             </a:fld>
             <a:endParaRPr lang="en-US"/>
           </a:p>
@@ -3297,7 +3236,7 @@
           <a:blip r:embed="rId2" cstate="print">
             <a:extLst>
               <a:ext uri="{28A0092B-C50C-407E-A947-70E740481C1C}">
-                <a14:useLocalDpi xmlns:a14="http://schemas.microsoft.com/office/drawing/2010/main" val="0"/>
+                <a14:useLocalDpi xmlns:a14="http://schemas.microsoft.com/office/drawing/2010/main" xmlns="" val="0"/>
               </a:ext>
             </a:extLst>
           </a:blip>
@@ -3354,7 +3293,7 @@
     </p:spTree>
     <p:extLst>
       <p:ext uri="{BB962C8B-B14F-4D97-AF65-F5344CB8AC3E}">
-        <p14:creationId xmlns:p14="http://schemas.microsoft.com/office/powerpoint/2010/main" val="4172443058"/>
+        <p14:creationId xmlns:p14="http://schemas.microsoft.com/office/powerpoint/2010/main" xmlns="" val="4172443058"/>
       </p:ext>
     </p:extLst>
   </p:cSld>
@@ -3576,7 +3515,7 @@
           <a:blip r:embed="rId2" cstate="print">
             <a:extLst>
               <a:ext uri="{28A0092B-C50C-407E-A947-70E740481C1C}">
-                <a14:useLocalDpi xmlns:a14="http://schemas.microsoft.com/office/drawing/2010/main" val="0"/>
+                <a14:useLocalDpi xmlns:a14="http://schemas.microsoft.com/office/drawing/2010/main" xmlns="" val="0"/>
               </a:ext>
             </a:extLst>
           </a:blip>
@@ -3633,7 +3572,7 @@
     </p:spTree>
     <p:extLst>
       <p:ext uri="{BB962C8B-B14F-4D97-AF65-F5344CB8AC3E}">
-        <p14:creationId xmlns:p14="http://schemas.microsoft.com/office/powerpoint/2010/main" val="893659651"/>
+        <p14:creationId xmlns:p14="http://schemas.microsoft.com/office/powerpoint/2010/main" xmlns="" val="893659651"/>
       </p:ext>
     </p:extLst>
   </p:cSld>
@@ -3879,7 +3818,7 @@
           <a:blip r:embed="rId2" cstate="print">
             <a:extLst>
               <a:ext uri="{28A0092B-C50C-407E-A947-70E740481C1C}">
-                <a14:useLocalDpi xmlns:a14="http://schemas.microsoft.com/office/drawing/2010/main" val="0"/>
+                <a14:useLocalDpi xmlns:a14="http://schemas.microsoft.com/office/drawing/2010/main" xmlns="" val="0"/>
               </a:ext>
             </a:extLst>
           </a:blip>
@@ -3936,7 +3875,7 @@
     </p:spTree>
     <p:extLst>
       <p:ext uri="{BB962C8B-B14F-4D97-AF65-F5344CB8AC3E}">
-        <p14:creationId xmlns:p14="http://schemas.microsoft.com/office/powerpoint/2010/main" val="1302427574"/>
+        <p14:creationId xmlns:p14="http://schemas.microsoft.com/office/powerpoint/2010/main" xmlns="" val="1302427574"/>
       </p:ext>
     </p:extLst>
   </p:cSld>
@@ -4250,7 +4189,7 @@
           <a:blip r:embed="rId2" cstate="print">
             <a:extLst>
               <a:ext uri="{28A0092B-C50C-407E-A947-70E740481C1C}">
-                <a14:useLocalDpi xmlns:a14="http://schemas.microsoft.com/office/drawing/2010/main" val="0"/>
+                <a14:useLocalDpi xmlns:a14="http://schemas.microsoft.com/office/drawing/2010/main" xmlns="" val="0"/>
               </a:ext>
             </a:extLst>
           </a:blip>
@@ -4307,7 +4246,7 @@
     </p:spTree>
     <p:extLst>
       <p:ext uri="{BB962C8B-B14F-4D97-AF65-F5344CB8AC3E}">
-        <p14:creationId xmlns:p14="http://schemas.microsoft.com/office/powerpoint/2010/main" val="2580853582"/>
+        <p14:creationId xmlns:p14="http://schemas.microsoft.com/office/powerpoint/2010/main" xmlns="" val="2580853582"/>
       </p:ext>
     </p:extLst>
   </p:cSld>
@@ -4525,7 +4464,7 @@
           <a:blip r:embed="rId2" cstate="print">
             <a:extLst>
               <a:ext uri="{28A0092B-C50C-407E-A947-70E740481C1C}">
-                <a14:useLocalDpi xmlns:a14="http://schemas.microsoft.com/office/drawing/2010/main" val="0"/>
+                <a14:useLocalDpi xmlns:a14="http://schemas.microsoft.com/office/drawing/2010/main" xmlns="" val="0"/>
               </a:ext>
             </a:extLst>
           </a:blip>
@@ -4582,7 +4521,7 @@
     </p:spTree>
     <p:extLst>
       <p:ext uri="{BB962C8B-B14F-4D97-AF65-F5344CB8AC3E}">
-        <p14:creationId xmlns:p14="http://schemas.microsoft.com/office/powerpoint/2010/main" val="2782147213"/>
+        <p14:creationId xmlns:p14="http://schemas.microsoft.com/office/powerpoint/2010/main" xmlns="" val="2782147213"/>
       </p:ext>
     </p:extLst>
   </p:cSld>
@@ -4800,7 +4739,7 @@
           <a:blip r:embed="rId2" cstate="print">
             <a:extLst>
               <a:ext uri="{28A0092B-C50C-407E-A947-70E740481C1C}">
-                <a14:useLocalDpi xmlns:a14="http://schemas.microsoft.com/office/drawing/2010/main" val="0"/>
+                <a14:useLocalDpi xmlns:a14="http://schemas.microsoft.com/office/drawing/2010/main" xmlns="" val="0"/>
               </a:ext>
             </a:extLst>
           </a:blip>
@@ -4925,7 +4864,7 @@
     </p:spTree>
     <p:extLst>
       <p:ext uri="{BB962C8B-B14F-4D97-AF65-F5344CB8AC3E}">
-        <p14:creationId xmlns:p14="http://schemas.microsoft.com/office/powerpoint/2010/main" val="2600426393"/>
+        <p14:creationId xmlns:p14="http://schemas.microsoft.com/office/powerpoint/2010/main" xmlns="" val="2600426393"/>
       </p:ext>
     </p:extLst>
   </p:cSld>
@@ -5143,7 +5082,7 @@
           <a:blip r:embed="rId2" cstate="print">
             <a:extLst>
               <a:ext uri="{28A0092B-C50C-407E-A947-70E740481C1C}">
-                <a14:useLocalDpi xmlns:a14="http://schemas.microsoft.com/office/drawing/2010/main" val="0"/>
+                <a14:useLocalDpi xmlns:a14="http://schemas.microsoft.com/office/drawing/2010/main" xmlns="" val="0"/>
               </a:ext>
             </a:extLst>
           </a:blip>
@@ -5268,7 +5207,7 @@
     </p:spTree>
     <p:extLst>
       <p:ext uri="{BB962C8B-B14F-4D97-AF65-F5344CB8AC3E}">
-        <p14:creationId xmlns:p14="http://schemas.microsoft.com/office/powerpoint/2010/main" val="1397017739"/>
+        <p14:creationId xmlns:p14="http://schemas.microsoft.com/office/powerpoint/2010/main" xmlns="" val="1397017739"/>
       </p:ext>
     </p:extLst>
   </p:cSld>
@@ -5475,7 +5414,7 @@
           <a:blip r:embed="rId2" cstate="print">
             <a:extLst>
               <a:ext uri="{28A0092B-C50C-407E-A947-70E740481C1C}">
-                <a14:useLocalDpi xmlns:a14="http://schemas.microsoft.com/office/drawing/2010/main" val="0"/>
+                <a14:useLocalDpi xmlns:a14="http://schemas.microsoft.com/office/drawing/2010/main" xmlns="" val="0"/>
               </a:ext>
             </a:extLst>
           </a:blip>
@@ -5505,7 +5444,7 @@
           <a:blip r:embed="rId3" cstate="print">
             <a:extLst>
               <a:ext uri="{28A0092B-C50C-407E-A947-70E740481C1C}">
-                <a14:useLocalDpi xmlns:a14="http://schemas.microsoft.com/office/drawing/2010/main" val="0"/>
+                <a14:useLocalDpi xmlns:a14="http://schemas.microsoft.com/office/drawing/2010/main" xmlns="" val="0"/>
               </a:ext>
             </a:extLst>
           </a:blip>
@@ -5565,7 +5504,7 @@
     </p:spTree>
     <p:extLst>
       <p:ext uri="{BB962C8B-B14F-4D97-AF65-F5344CB8AC3E}">
-        <p14:creationId xmlns:p14="http://schemas.microsoft.com/office/powerpoint/2010/main" val="224187675"/>
+        <p14:creationId xmlns:p14="http://schemas.microsoft.com/office/powerpoint/2010/main" xmlns="" val="224187675"/>
       </p:ext>
     </p:extLst>
   </p:cSld>
@@ -5675,7 +5614,7 @@
             <a:fld id="{9D21D778-B565-4D7E-94D7-64010A445B68}" type="datetimeFigureOut">
               <a:rPr lang="en-US" smtClean="0"/>
               <a:pPr eaLnBrk="1" latinLnBrk="0" hangingPunct="1"/>
-              <a:t>2/9/2014</a:t>
+              <a:t>2/11/2014</a:t>
             </a:fld>
             <a:endParaRPr lang="en-US"/>
           </a:p>
@@ -6093,7 +6032,7 @@
           <a:blip r:embed="rId2" cstate="print">
             <a:extLst>
               <a:ext uri="{28A0092B-C50C-407E-A947-70E740481C1C}">
-                <a14:useLocalDpi xmlns:a14="http://schemas.microsoft.com/office/drawing/2010/main" val="0"/>
+                <a14:useLocalDpi xmlns:a14="http://schemas.microsoft.com/office/drawing/2010/main" xmlns="" val="0"/>
               </a:ext>
             </a:extLst>
           </a:blip>
@@ -6123,7 +6062,7 @@
           <a:blip r:embed="rId3" cstate="print">
             <a:extLst>
               <a:ext uri="{28A0092B-C50C-407E-A947-70E740481C1C}">
-                <a14:useLocalDpi xmlns:a14="http://schemas.microsoft.com/office/drawing/2010/main" val="0"/>
+                <a14:useLocalDpi xmlns:a14="http://schemas.microsoft.com/office/drawing/2010/main" xmlns="" val="0"/>
               </a:ext>
             </a:extLst>
           </a:blip>
@@ -6183,7 +6122,7 @@
     </p:spTree>
     <p:extLst>
       <p:ext uri="{BB962C8B-B14F-4D97-AF65-F5344CB8AC3E}">
-        <p14:creationId xmlns:p14="http://schemas.microsoft.com/office/powerpoint/2010/main" val="127214035"/>
+        <p14:creationId xmlns:p14="http://schemas.microsoft.com/office/powerpoint/2010/main" xmlns="" val="127214035"/>
       </p:ext>
     </p:extLst>
   </p:cSld>
@@ -6323,7 +6262,7 @@
           <a:blip r:embed="rId2" cstate="print">
             <a:extLst>
               <a:ext uri="{28A0092B-C50C-407E-A947-70E740481C1C}">
-                <a14:useLocalDpi xmlns:a14="http://schemas.microsoft.com/office/drawing/2010/main" val="0"/>
+                <a14:useLocalDpi xmlns:a14="http://schemas.microsoft.com/office/drawing/2010/main" xmlns="" val="0"/>
               </a:ext>
             </a:extLst>
           </a:blip>
@@ -6416,7 +6355,7 @@
     </p:spTree>
     <p:extLst>
       <p:ext uri="{BB962C8B-B14F-4D97-AF65-F5344CB8AC3E}">
-        <p14:creationId xmlns:p14="http://schemas.microsoft.com/office/powerpoint/2010/main" val="3004179911"/>
+        <p14:creationId xmlns:p14="http://schemas.microsoft.com/office/powerpoint/2010/main" xmlns="" val="3004179911"/>
       </p:ext>
     </p:extLst>
   </p:cSld>
@@ -6623,7 +6562,7 @@
           <a:effectLst/>
           <a:extLst>
             <a:ext uri="{AF507438-7753-43E0-B8FC-AC1667EBCBE1}">
-              <a14:hiddenEffects xmlns:a14="http://schemas.microsoft.com/office/drawing/2010/main">
+              <a14:hiddenEffects xmlns:a14="http://schemas.microsoft.com/office/drawing/2010/main" xmlns="">
                 <a:effectLst>
                   <a:outerShdw dist="35921" dir="2700000" algn="ctr" rotWithShape="0">
                     <a:schemeClr val="bg2"/>
@@ -6689,7 +6628,7 @@
           <a:blip r:embed="rId2" cstate="print">
             <a:extLst>
               <a:ext uri="{28A0092B-C50C-407E-A947-70E740481C1C}">
-                <a14:useLocalDpi xmlns:a14="http://schemas.microsoft.com/office/drawing/2010/main" val="0"/>
+                <a14:useLocalDpi xmlns:a14="http://schemas.microsoft.com/office/drawing/2010/main" xmlns="" val="0"/>
               </a:ext>
             </a:extLst>
           </a:blip>
@@ -6746,7 +6685,7 @@
     </p:spTree>
     <p:extLst>
       <p:ext uri="{BB962C8B-B14F-4D97-AF65-F5344CB8AC3E}">
-        <p14:creationId xmlns:p14="http://schemas.microsoft.com/office/powerpoint/2010/main" val="86675937"/>
+        <p14:creationId xmlns:p14="http://schemas.microsoft.com/office/powerpoint/2010/main" xmlns="" val="86675937"/>
       </p:ext>
     </p:extLst>
   </p:cSld>
@@ -6895,7 +6834,7 @@
           <a:blip r:embed="rId2" cstate="print">
             <a:extLst>
               <a:ext uri="{28A0092B-C50C-407E-A947-70E740481C1C}">
-                <a14:useLocalDpi xmlns:a14="http://schemas.microsoft.com/office/drawing/2010/main" val="0"/>
+                <a14:useLocalDpi xmlns:a14="http://schemas.microsoft.com/office/drawing/2010/main" xmlns="" val="0"/>
               </a:ext>
             </a:extLst>
           </a:blip>
@@ -6952,7 +6891,7 @@
     </p:spTree>
     <p:extLst>
       <p:ext uri="{BB962C8B-B14F-4D97-AF65-F5344CB8AC3E}">
-        <p14:creationId xmlns:p14="http://schemas.microsoft.com/office/powerpoint/2010/main" val="8285584"/>
+        <p14:creationId xmlns:p14="http://schemas.microsoft.com/office/powerpoint/2010/main" xmlns="" val="8285584"/>
       </p:ext>
     </p:extLst>
   </p:cSld>
@@ -7077,7 +7016,7 @@
           <a:blip r:embed="rId2" cstate="print">
             <a:extLst>
               <a:ext uri="{28A0092B-C50C-407E-A947-70E740481C1C}">
-                <a14:useLocalDpi xmlns:a14="http://schemas.microsoft.com/office/drawing/2010/main" val="0"/>
+                <a14:useLocalDpi xmlns:a14="http://schemas.microsoft.com/office/drawing/2010/main" xmlns="" val="0"/>
               </a:ext>
             </a:extLst>
           </a:blip>
@@ -7102,7 +7041,7 @@
           <p:nvPr userDrawn="1">
             <p:extLst>
               <p:ext uri="{D42A27DB-BD31-4B8C-83A1-F6EECF244321}">
-                <p14:modId xmlns:p14="http://schemas.microsoft.com/office/powerpoint/2010/main" val="1618250192"/>
+                <p14:modId xmlns:p14="http://schemas.microsoft.com/office/powerpoint/2010/main" xmlns="" val="1618250192"/>
               </p:ext>
             </p:extLst>
           </p:nvPr>
@@ -7156,7 +7095,7 @@
     </p:spTree>
     <p:extLst>
       <p:ext uri="{BB962C8B-B14F-4D97-AF65-F5344CB8AC3E}">
-        <p14:creationId xmlns:p14="http://schemas.microsoft.com/office/powerpoint/2010/main" val="804500376"/>
+        <p14:creationId xmlns:p14="http://schemas.microsoft.com/office/powerpoint/2010/main" xmlns="" val="804500376"/>
       </p:ext>
     </p:extLst>
   </p:cSld>
@@ -7276,7 +7215,7 @@
           <a:blip r:embed="rId2" cstate="print">
             <a:extLst>
               <a:ext uri="{28A0092B-C50C-407E-A947-70E740481C1C}">
-                <a14:useLocalDpi xmlns:a14="http://schemas.microsoft.com/office/drawing/2010/main" val="0"/>
+                <a14:useLocalDpi xmlns:a14="http://schemas.microsoft.com/office/drawing/2010/main" xmlns="" val="0"/>
               </a:ext>
             </a:extLst>
           </a:blip>
@@ -7301,7 +7240,7 @@
           <p:nvPr userDrawn="1">
             <p:extLst>
               <p:ext uri="{D42A27DB-BD31-4B8C-83A1-F6EECF244321}">
-                <p14:modId xmlns:p14="http://schemas.microsoft.com/office/powerpoint/2010/main" val="1658717376"/>
+                <p14:modId xmlns:p14="http://schemas.microsoft.com/office/powerpoint/2010/main" xmlns="" val="1658717376"/>
               </p:ext>
             </p:extLst>
           </p:nvPr>
@@ -7355,7 +7294,7 @@
     </p:spTree>
     <p:extLst>
       <p:ext uri="{BB962C8B-B14F-4D97-AF65-F5344CB8AC3E}">
-        <p14:creationId xmlns:p14="http://schemas.microsoft.com/office/powerpoint/2010/main" val="3472530406"/>
+        <p14:creationId xmlns:p14="http://schemas.microsoft.com/office/powerpoint/2010/main" xmlns="" val="3472530406"/>
       </p:ext>
     </p:extLst>
   </p:cSld>
@@ -7475,7 +7414,7 @@
           <a:blip r:embed="rId2" cstate="print">
             <a:extLst>
               <a:ext uri="{28A0092B-C50C-407E-A947-70E740481C1C}">
-                <a14:useLocalDpi xmlns:a14="http://schemas.microsoft.com/office/drawing/2010/main" val="0"/>
+                <a14:useLocalDpi xmlns:a14="http://schemas.microsoft.com/office/drawing/2010/main" xmlns="" val="0"/>
               </a:ext>
             </a:extLst>
           </a:blip>
@@ -7532,7 +7471,7 @@
     </p:spTree>
     <p:extLst>
       <p:ext uri="{BB962C8B-B14F-4D97-AF65-F5344CB8AC3E}">
-        <p14:creationId xmlns:p14="http://schemas.microsoft.com/office/powerpoint/2010/main" val="2188433489"/>
+        <p14:creationId xmlns:p14="http://schemas.microsoft.com/office/powerpoint/2010/main" xmlns="" val="2188433489"/>
       </p:ext>
     </p:extLst>
   </p:cSld>
@@ -7716,7 +7655,7 @@
           <a:blip r:embed="rId2" cstate="print">
             <a:extLst>
               <a:ext uri="{28A0092B-C50C-407E-A947-70E740481C1C}">
-                <a14:useLocalDpi xmlns:a14="http://schemas.microsoft.com/office/drawing/2010/main" val="0"/>
+                <a14:useLocalDpi xmlns:a14="http://schemas.microsoft.com/office/drawing/2010/main" xmlns="" val="0"/>
               </a:ext>
             </a:extLst>
           </a:blip>
@@ -7773,7 +7712,7 @@
     </p:spTree>
     <p:extLst>
       <p:ext uri="{BB962C8B-B14F-4D97-AF65-F5344CB8AC3E}">
-        <p14:creationId xmlns:p14="http://schemas.microsoft.com/office/powerpoint/2010/main" val="1793845065"/>
+        <p14:creationId xmlns:p14="http://schemas.microsoft.com/office/powerpoint/2010/main" xmlns="" val="1793845065"/>
       </p:ext>
     </p:extLst>
   </p:cSld>
@@ -7962,7 +7901,7 @@
           <a:blip r:embed="rId2" cstate="print">
             <a:extLst>
               <a:ext uri="{28A0092B-C50C-407E-A947-70E740481C1C}">
-                <a14:useLocalDpi xmlns:a14="http://schemas.microsoft.com/office/drawing/2010/main" val="0"/>
+                <a14:useLocalDpi xmlns:a14="http://schemas.microsoft.com/office/drawing/2010/main" xmlns="" val="0"/>
               </a:ext>
             </a:extLst>
           </a:blip>
@@ -8019,7 +7958,7 @@
     </p:spTree>
     <p:extLst>
       <p:ext uri="{BB962C8B-B14F-4D97-AF65-F5344CB8AC3E}">
-        <p14:creationId xmlns:p14="http://schemas.microsoft.com/office/powerpoint/2010/main" val="1669791555"/>
+        <p14:creationId xmlns:p14="http://schemas.microsoft.com/office/powerpoint/2010/main" xmlns="" val="1669791555"/>
       </p:ext>
     </p:extLst>
   </p:cSld>
@@ -8395,7 +8334,7 @@
             <a:fld id="{9D21D778-B565-4D7E-94D7-64010A445B68}" type="datetimeFigureOut">
               <a:rPr lang="en-US" smtClean="0"/>
               <a:pPr eaLnBrk="1" latinLnBrk="0" hangingPunct="1"/>
-              <a:t>2/9/2014</a:t>
+              <a:t>2/11/2014</a:t>
             </a:fld>
             <a:endParaRPr lang="en-US"/>
           </a:p>
@@ -8456,7 +8395,7 @@
           <a:blip r:embed="rId3" cstate="print">
             <a:extLst>
               <a:ext uri="{28A0092B-C50C-407E-A947-70E740481C1C}">
-                <a14:useLocalDpi xmlns:a14="http://schemas.microsoft.com/office/drawing/2010/main" val="0"/>
+                <a14:useLocalDpi xmlns:a14="http://schemas.microsoft.com/office/drawing/2010/main" xmlns="" val="0"/>
               </a:ext>
             </a:extLst>
           </a:blip>
@@ -8518,7 +8457,7 @@
             <a:fld id="{9D21D778-B565-4D7E-94D7-64010A445B68}" type="datetimeFigureOut">
               <a:rPr lang="en-US" smtClean="0"/>
               <a:pPr eaLnBrk="1" latinLnBrk="0" hangingPunct="1"/>
-              <a:t>2/9/2014</a:t>
+              <a:t>2/11/2014</a:t>
             </a:fld>
             <a:endParaRPr lang="en-US"/>
           </a:p>
@@ -9239,7 +9178,7 @@
             <a:fld id="{9D21D778-B565-4D7E-94D7-64010A445B68}" type="datetimeFigureOut">
               <a:rPr lang="en-US" smtClean="0"/>
               <a:pPr eaLnBrk="1" latinLnBrk="0" hangingPunct="1"/>
-              <a:t>2/9/2014</a:t>
+              <a:t>2/11/2014</a:t>
             </a:fld>
             <a:endParaRPr lang="en-US"/>
           </a:p>
@@ -9503,7 +9442,7 @@
             <a:fld id="{9D21D778-B565-4D7E-94D7-64010A445B68}" type="datetimeFigureOut">
               <a:rPr lang="en-US" smtClean="0"/>
               <a:pPr eaLnBrk="1" latinLnBrk="0" hangingPunct="1"/>
-              <a:t>2/9/2014</a:t>
+              <a:t>2/11/2014</a:t>
             </a:fld>
             <a:endParaRPr lang="en-US"/>
           </a:p>
@@ -9744,7 +9683,7 @@
             <a:fld id="{9D21D778-B565-4D7E-94D7-64010A445B68}" type="datetimeFigureOut">
               <a:rPr lang="en-US" smtClean="0"/>
               <a:pPr eaLnBrk="1" latinLnBrk="0" hangingPunct="1"/>
-              <a:t>2/9/2014</a:t>
+              <a:t>2/11/2014</a:t>
             </a:fld>
             <a:endParaRPr lang="en-US"/>
           </a:p>
@@ -10030,7 +9969,7 @@
             <a:fld id="{9D21D778-B565-4D7E-94D7-64010A445B68}" type="datetimeFigureOut">
               <a:rPr lang="en-US" smtClean="0"/>
               <a:pPr eaLnBrk="1" latinLnBrk="0" hangingPunct="1"/>
-              <a:t>2/9/2014</a:t>
+              <a:t>2/11/2014</a:t>
             </a:fld>
             <a:endParaRPr lang="en-US"/>
           </a:p>
@@ -10328,7 +10267,7 @@
             <a:fld id="{9D21D778-B565-4D7E-94D7-64010A445B68}" type="datetimeFigureOut">
               <a:rPr lang="en-US" smtClean="0"/>
               <a:pPr eaLnBrk="1" latinLnBrk="0" hangingPunct="1"/>
-              <a:t>2/9/2014</a:t>
+              <a:t>2/11/2014</a:t>
             </a:fld>
             <a:endParaRPr lang="en-US" dirty="0"/>
           </a:p>
@@ -10608,7 +10547,7 @@
             <a:fld id="{9D21D778-B565-4D7E-94D7-64010A445B68}" type="datetimeFigureOut">
               <a:rPr lang="en-US" smtClean="0"/>
               <a:pPr algn="r" eaLnBrk="1" latinLnBrk="0" hangingPunct="1"/>
-              <a:t>2/9/2014</a:t>
+              <a:t>2/11/2014</a:t>
             </a:fld>
             <a:endParaRPr lang="en-US" sz="1400" dirty="0">
               <a:solidFill>
@@ -11276,7 +11215,7 @@
     </p:spTree>
     <p:extLst>
       <p:ext uri="{BB962C8B-B14F-4D97-AF65-F5344CB8AC3E}">
-        <p14:creationId xmlns:p14="http://schemas.microsoft.com/office/powerpoint/2010/main" val="828821643"/>
+        <p14:creationId xmlns:p14="http://schemas.microsoft.com/office/powerpoint/2010/main" xmlns="" val="828821643"/>
       </p:ext>
     </p:extLst>
   </p:cSld>
@@ -11382,7 +11321,7 @@
         </p:spPr>
         <p:txBody>
           <a:bodyPr>
-            <a:normAutofit fontScale="77500" lnSpcReduction="20000"/>
+            <a:normAutofit fontScale="85000" lnSpcReduction="20000"/>
           </a:bodyPr>
           <a:lstStyle/>
           <a:p>
@@ -11424,8 +11363,21 @@
                   <a:srgbClr val="FF0000"/>
                 </a:solidFill>
               </a:rPr>
-              <a:t>  Herding Sheep</a:t>
-            </a:r>
+              <a:t>  </a:t>
+            </a:r>
+            <a:r>
+              <a:rPr lang="en-GB" sz="1800" b="1" dirty="0" smtClean="0">
+                <a:solidFill>
+                  <a:srgbClr val="FF0000"/>
+                </a:solidFill>
+              </a:rPr>
+              <a:t>Sheep Herder</a:t>
+            </a:r>
+            <a:endParaRPr lang="en-GB" sz="1800" b="1" dirty="0" smtClean="0">
+              <a:solidFill>
+                <a:srgbClr val="FF0000"/>
+              </a:solidFill>
+            </a:endParaRPr>
           </a:p>
           <a:p>
             <a:pPr marL="0" indent="0">
@@ -11446,49 +11398,42 @@
               </a:rPr>
               <a:t>Project overview: </a:t>
             </a:r>
-          </a:p>
-          <a:p>
-            <a:pPr marL="0" indent="0">
+            <a:r>
+              <a:rPr lang="en-GB" dirty="0" smtClean="0"/>
+              <a:t>    </a:t>
+            </a:r>
+          </a:p>
+          <a:p>
+            <a:pPr marL="411480" lvl="1" indent="0">
+              <a:lnSpc>
+                <a:spcPct val="120000"/>
+              </a:lnSpc>
               <a:buNone/>
             </a:pPr>
+            <a:endParaRPr lang="en-GB" dirty="0" smtClean="0"/>
+          </a:p>
+          <a:p>
+            <a:pPr marL="411480" lvl="1" indent="0">
+              <a:lnSpc>
+                <a:spcPct val="120000"/>
+              </a:lnSpc>
+              <a:buNone/>
+            </a:pPr>
             <a:r>
               <a:rPr lang="en-GB" dirty="0" smtClean="0"/>
-              <a:t>    A Dog will herd many Sheep – providing guidance and security </a:t>
-            </a:r>
-          </a:p>
-          <a:p>
-            <a:pPr marL="0" indent="0">
-              <a:buNone/>
-            </a:pPr>
-            <a:r>
-              <a:rPr lang="en-GB" dirty="0"/>
+              <a:t>This project consists of a game where the user controls a dog, the “Sheep </a:t>
+            </a:r>
+            <a:r>
+              <a:rPr lang="en-GB" dirty="0" smtClean="0"/>
+              <a:t>H</a:t>
+            </a:r>
+            <a:r>
+              <a:rPr lang="en-GB" dirty="0" smtClean="0"/>
+              <a:t>erder”, and is responsible for keeping the sheep together, avoiding the perils of the dangerous fox that can come at any time. </a:t>
+            </a:r>
+            <a:r>
+              <a:rPr lang="en-GB" dirty="0" smtClean="0"/>
               <a:t> </a:t>
-            </a:r>
-            <a:r>
-              <a:rPr lang="en-GB" dirty="0" smtClean="0"/>
-              <a:t>    for all Sheep. </a:t>
-            </a:r>
-          </a:p>
-          <a:p>
-            <a:pPr marL="0" indent="0">
-              <a:buNone/>
-            </a:pPr>
-            <a:r>
-              <a:rPr lang="en-GB" dirty="0" smtClean="0"/>
-              <a:t>    The dog must make sure no sheep goes out of sight </a:t>
-            </a:r>
-          </a:p>
-          <a:p>
-            <a:pPr marL="0" indent="0">
-              <a:buNone/>
-            </a:pPr>
-            <a:r>
-              <a:rPr lang="en-GB" dirty="0"/>
-              <a:t> </a:t>
-            </a:r>
-            <a:r>
-              <a:rPr lang="en-GB" dirty="0" smtClean="0"/>
-              <a:t>   The dog must also protect all Sheep from predator – a Fox/ Foxes</a:t>
             </a:r>
           </a:p>
           <a:p>
@@ -11504,25 +11449,23 @@
                   <a:srgbClr val="FF0000"/>
                 </a:solidFill>
               </a:rPr>
-              <a:t>Features the completed project will include are</a:t>
-            </a:r>
-            <a:r>
-              <a:rPr lang="en-GB" dirty="0" smtClean="0"/>
-              <a:t>:</a:t>
-            </a:r>
-          </a:p>
-          <a:p>
-            <a:pPr marL="0" indent="0">
+              <a:t>Characters Definition</a:t>
+            </a:r>
+          </a:p>
+          <a:p>
+            <a:pPr>
               <a:buNone/>
             </a:pPr>
-            <a:r>
-              <a:rPr lang="en-GB" dirty="0"/>
-              <a:t> </a:t>
-            </a:r>
-            <a:r>
-              <a:rPr lang="en-GB" dirty="0" smtClean="0"/>
-              <a:t>  1.) </a:t>
-            </a:r>
+            <a:endParaRPr lang="en-GB" b="1" u="sng" dirty="0" smtClean="0">
+              <a:solidFill>
+                <a:srgbClr val="FF0000"/>
+              </a:solidFill>
+            </a:endParaRPr>
+          </a:p>
+          <a:p>
+            <a:pPr marL="868680" lvl="1" indent="-457200">
+              <a:buNone/>
+            </a:pPr>
             <a:r>
               <a:rPr lang="en-GB" b="1" u="sng" dirty="0" smtClean="0">
                 <a:solidFill>
@@ -11531,66 +11474,44 @@
               </a:rPr>
               <a:t>Sheep</a:t>
             </a:r>
-          </a:p>
-          <a:p>
-            <a:pPr marL="0" indent="0">
-              <a:buNone/>
+            <a:endParaRPr lang="en-GB" b="1" u="sng" dirty="0" smtClean="0">
+              <a:solidFill>
+                <a:schemeClr val="accent4"/>
+              </a:solidFill>
+            </a:endParaRPr>
+          </a:p>
+          <a:p>
+            <a:pPr marL="777240" lvl="2" indent="0">
+              <a:buFont typeface="Courier New" pitchFamily="49" charset="0"/>
+              <a:buChar char="o"/>
             </a:pPr>
             <a:r>
-              <a:rPr lang="en-GB" dirty="0"/>
+              <a:rPr lang="en-GB" dirty="0" smtClean="0"/>
+              <a:t> Is not allowed to go out of screen</a:t>
+            </a:r>
+          </a:p>
+          <a:p>
+            <a:pPr marL="777240" lvl="2" indent="0">
+              <a:buFont typeface="Courier New" pitchFamily="49" charset="0"/>
+              <a:buChar char="o"/>
+            </a:pPr>
+            <a:r>
+              <a:rPr lang="en-GB" dirty="0" smtClean="0"/>
+              <a:t> They can go to any direction, and move by reaction to dog’s or fox’s proximity</a:t>
+            </a:r>
+          </a:p>
+          <a:p>
+            <a:pPr marL="777240" lvl="2" indent="0">
+              <a:buFont typeface="Courier New" pitchFamily="49" charset="0"/>
+              <a:buChar char="o"/>
+            </a:pPr>
+            <a:r>
+              <a:rPr lang="en-GB" dirty="0" smtClean="0"/>
               <a:t> </a:t>
             </a:r>
             <a:r>
               <a:rPr lang="en-GB" dirty="0" smtClean="0"/>
-              <a:t>               - All sheep must remain within the dog’s proximity</a:t>
-            </a:r>
-          </a:p>
-          <a:p>
-            <a:pPr marL="0" indent="0">
-              <a:buNone/>
-            </a:pPr>
-            <a:r>
-              <a:rPr lang="en-GB" dirty="0"/>
-              <a:t> </a:t>
-            </a:r>
-            <a:r>
-              <a:rPr lang="en-GB" dirty="0" smtClean="0"/>
-              <a:t>               -Allow to go in the direction of up, right and left (not backward </a:t>
-            </a:r>
-          </a:p>
-          <a:p>
-            <a:pPr marL="0" indent="0">
-              <a:buNone/>
-            </a:pPr>
-            <a:r>
-              <a:rPr lang="en-GB" dirty="0"/>
-              <a:t> </a:t>
-            </a:r>
-            <a:r>
-              <a:rPr lang="en-GB" dirty="0" smtClean="0"/>
-              <a:t>                 or behind the dog) </a:t>
-            </a:r>
-          </a:p>
-          <a:p>
-            <a:pPr marL="0" indent="0">
-              <a:buNone/>
-            </a:pPr>
-            <a:r>
-              <a:rPr lang="en-GB" dirty="0"/>
-              <a:t> </a:t>
-            </a:r>
-            <a:r>
-              <a:rPr lang="en-GB" dirty="0" smtClean="0"/>
-              <a:t>               - Not allowed to go out of sight</a:t>
-            </a:r>
-          </a:p>
-          <a:p>
-            <a:pPr marL="0" indent="0">
-              <a:buNone/>
-            </a:pPr>
-            <a:r>
-              <a:rPr lang="en-GB" dirty="0"/>
-              <a:t> </a:t>
+              <a:t>They are slower than the other animals</a:t>
             </a:r>
             <a:endParaRPr lang="en-GB" dirty="0" smtClean="0"/>
           </a:p>
@@ -11599,7 +11520,7 @@
     </p:spTree>
     <p:extLst>
       <p:ext uri="{BB962C8B-B14F-4D97-AF65-F5344CB8AC3E}">
-        <p14:creationId xmlns:p14="http://schemas.microsoft.com/office/powerpoint/2010/main" val="4290846282"/>
+        <p14:creationId xmlns:p14="http://schemas.microsoft.com/office/powerpoint/2010/main" xmlns="" val="4290846282"/>
       </p:ext>
     </p:extLst>
   </p:cSld>
@@ -11675,14 +11596,11 @@
         </p:spPr>
         <p:txBody>
           <a:bodyPr>
-            <a:normAutofit fontScale="92500" lnSpcReduction="20000"/>
+            <a:normAutofit fontScale="62500" lnSpcReduction="20000"/>
           </a:bodyPr>
           <a:lstStyle/>
           <a:p>
-            <a:endParaRPr lang="en-US" dirty="0" smtClean="0"/>
-          </a:p>
-          <a:p>
-            <a:pPr marL="0" indent="0">
+            <a:pPr marL="868680" lvl="1" indent="-457200">
               <a:buNone/>
             </a:pPr>
             <a:r>
@@ -11691,73 +11609,53 @@
                   <a:schemeClr val="accent4"/>
                 </a:solidFill>
               </a:rPr>
-              <a:t> Dog</a:t>
-            </a:r>
-          </a:p>
-          <a:p>
-            <a:pPr marL="0" indent="0">
-              <a:buNone/>
+              <a:t>Dog</a:t>
+            </a:r>
+            <a:endParaRPr lang="en-US" b="1" u="sng" dirty="0" smtClean="0">
+              <a:solidFill>
+                <a:schemeClr val="accent4"/>
+              </a:solidFill>
+            </a:endParaRPr>
+          </a:p>
+          <a:p>
+            <a:pPr marL="777240" lvl="2" indent="0">
+              <a:buFont typeface="Courier New" pitchFamily="49" charset="0"/>
+              <a:buChar char="o"/>
             </a:pPr>
             <a:r>
               <a:rPr lang="en-US" dirty="0" smtClean="0"/>
-              <a:t>        - keeps the sheep within his proximity</a:t>
-            </a:r>
-          </a:p>
-          <a:p>
-            <a:pPr marL="0" indent="0">
-              <a:buNone/>
+              <a:t> Keeps the sheep safe</a:t>
+            </a:r>
+          </a:p>
+          <a:p>
+            <a:pPr marL="777240" lvl="2" indent="0">
+              <a:buFont typeface="Courier New" pitchFamily="49" charset="0"/>
+              <a:buChar char="o"/>
             </a:pPr>
-            <a:r>
-              <a:rPr lang="en-US" dirty="0" smtClean="0"/>
-              <a:t>        - Chase the predator (fox) away</a:t>
-            </a:r>
-          </a:p>
-          <a:p>
-            <a:pPr marL="0" indent="0">
-              <a:buNone/>
-            </a:pPr>
-            <a:r>
-              <a:rPr lang="en-US" dirty="0" smtClean="0"/>
-              <a:t>        - Controlled by either touch screen / </a:t>
-            </a:r>
-          </a:p>
-          <a:p>
-            <a:pPr marL="0" indent="0">
-              <a:buNone/>
-            </a:pPr>
-            <a:r>
-              <a:rPr lang="en-US" dirty="0"/>
-              <a:t> </a:t>
-            </a:r>
-            <a:r>
-              <a:rPr lang="en-US" dirty="0" smtClean="0"/>
-              <a:t>          keyboard</a:t>
-            </a:r>
-          </a:p>
-          <a:p>
-            <a:pPr marL="0" indent="0">
-              <a:buNone/>
-            </a:pPr>
-            <a:endParaRPr lang="en-US" dirty="0" smtClean="0"/>
-          </a:p>
-          <a:p>
-            <a:pPr marL="0" indent="0">
-              <a:buNone/>
-            </a:pPr>
-            <a:endParaRPr lang="en-US" dirty="0"/>
-          </a:p>
-          <a:p>
-            <a:pPr marL="0" indent="0">
-              <a:buNone/>
-            </a:pPr>
-            <a:r>
-              <a:rPr lang="en-US" dirty="0"/>
-              <a:t> </a:t>
-            </a:r>
             <a:r>
               <a:rPr lang="en-US" dirty="0" smtClean="0"/>
               <a:t> </a:t>
             </a:r>
+            <a:r>
+              <a:rPr lang="en-US" dirty="0" smtClean="0"/>
+              <a:t>Chases the predator away (fox)</a:t>
+            </a:r>
+            <a:endParaRPr lang="en-US" dirty="0" smtClean="0"/>
+          </a:p>
+          <a:p>
+            <a:pPr marL="411480" lvl="1" indent="0">
+              <a:buNone/>
+            </a:pPr>
+            <a:endParaRPr lang="en-US" b="1" u="sng" dirty="0" smtClean="0">
+              <a:solidFill>
+                <a:schemeClr val="accent4"/>
+              </a:solidFill>
+            </a:endParaRPr>
+          </a:p>
+          <a:p>
+            <a:pPr marL="411480" lvl="1" indent="0">
+              <a:buNone/>
+            </a:pPr>
             <a:r>
               <a:rPr lang="en-US" b="1" u="sng" dirty="0" smtClean="0">
                 <a:solidFill>
@@ -11766,6 +11664,206 @@
               </a:rPr>
               <a:t>Fox</a:t>
             </a:r>
+            <a:endParaRPr lang="en-US" b="1" u="sng" dirty="0" smtClean="0">
+              <a:solidFill>
+                <a:schemeClr val="accent4"/>
+              </a:solidFill>
+            </a:endParaRPr>
+          </a:p>
+          <a:p>
+            <a:pPr marL="777240" lvl="2" indent="0">
+              <a:buFont typeface="Courier New" pitchFamily="49" charset="0"/>
+              <a:buChar char="o"/>
+            </a:pPr>
+            <a:r>
+              <a:rPr lang="en-US" dirty="0" smtClean="0"/>
+              <a:t> Chases sheep to eat them</a:t>
+            </a:r>
+          </a:p>
+          <a:p>
+            <a:pPr marL="777240" lvl="2" indent="0">
+              <a:buFont typeface="Courier New" pitchFamily="49" charset="0"/>
+              <a:buChar char="o"/>
+            </a:pPr>
+            <a:r>
+              <a:rPr lang="en-US" dirty="0" smtClean="0"/>
+              <a:t> </a:t>
+            </a:r>
+            <a:r>
+              <a:rPr lang="en-US" dirty="0" smtClean="0"/>
+              <a:t>Runs away from the dog</a:t>
+            </a:r>
+          </a:p>
+          <a:p>
+            <a:pPr marL="777240" lvl="2" indent="0">
+              <a:buFont typeface="Courier New" pitchFamily="49" charset="0"/>
+              <a:buChar char="o"/>
+            </a:pPr>
+            <a:r>
+              <a:rPr lang="en-US" dirty="0" smtClean="0"/>
+              <a:t> </a:t>
+            </a:r>
+            <a:r>
+              <a:rPr lang="en-US" dirty="0" smtClean="0"/>
+              <a:t>Appears on the game at random</a:t>
+            </a:r>
+          </a:p>
+          <a:p>
+            <a:pPr marL="0" indent="0">
+              <a:buNone/>
+            </a:pPr>
+            <a:endParaRPr lang="en-GB" dirty="0" smtClean="0"/>
+          </a:p>
+          <a:p>
+            <a:r>
+              <a:rPr lang="en-GB" b="1" u="sng" dirty="0" smtClean="0">
+                <a:solidFill>
+                  <a:srgbClr val="FF0000"/>
+                </a:solidFill>
+              </a:rPr>
+              <a:t>Project Features</a:t>
+            </a:r>
+          </a:p>
+          <a:p>
+            <a:pPr marL="411480" lvl="1" indent="0">
+              <a:buNone/>
+            </a:pPr>
+            <a:r>
+              <a:rPr lang="en-GB" b="1" u="sng" dirty="0" smtClean="0">
+                <a:solidFill>
+                  <a:srgbClr val="FF0000"/>
+                </a:solidFill>
+              </a:rPr>
+              <a:t> </a:t>
+            </a:r>
+          </a:p>
+          <a:p>
+            <a:pPr marL="411480" lvl="1" indent="0">
+              <a:buFont typeface="Wingdings" pitchFamily="2" charset="2"/>
+              <a:buChar char="§"/>
+            </a:pPr>
+            <a:r>
+              <a:rPr lang="en-GB" dirty="0" smtClean="0">
+                <a:solidFill>
+                  <a:schemeClr val="tx1"/>
+                </a:solidFill>
+              </a:rPr>
+              <a:t> Representation of each animal and its characteristics</a:t>
+            </a:r>
+          </a:p>
+          <a:p>
+            <a:pPr marL="411480" lvl="1" indent="0">
+              <a:buFont typeface="Wingdings" pitchFamily="2" charset="2"/>
+              <a:buChar char="§"/>
+            </a:pPr>
+            <a:r>
+              <a:rPr lang="en-GB" dirty="0" smtClean="0">
+                <a:solidFill>
+                  <a:schemeClr val="tx1"/>
+                </a:solidFill>
+              </a:rPr>
+              <a:t> Full screen game with independent rendering (for each set of animals)</a:t>
+            </a:r>
+          </a:p>
+          <a:p>
+            <a:pPr marL="411480" lvl="1" indent="0">
+              <a:buFont typeface="Wingdings" pitchFamily="2" charset="2"/>
+              <a:buChar char="§"/>
+            </a:pPr>
+            <a:r>
+              <a:rPr lang="en-GB" dirty="0" smtClean="0">
+                <a:solidFill>
+                  <a:schemeClr val="tx1"/>
+                </a:solidFill>
+              </a:rPr>
+              <a:t> </a:t>
+            </a:r>
+            <a:r>
+              <a:rPr lang="en-GB" dirty="0" smtClean="0">
+                <a:solidFill>
+                  <a:schemeClr val="tx1"/>
+                </a:solidFill>
+              </a:rPr>
+              <a:t>User has full control over the dog</a:t>
+            </a:r>
+          </a:p>
+          <a:p>
+            <a:pPr marL="411480" lvl="1" indent="0">
+              <a:buFont typeface="Wingdings" pitchFamily="2" charset="2"/>
+              <a:buChar char="§"/>
+            </a:pPr>
+            <a:r>
+              <a:rPr lang="en-GB" dirty="0" smtClean="0">
+                <a:solidFill>
+                  <a:schemeClr val="tx1"/>
+                </a:solidFill>
+              </a:rPr>
+              <a:t> </a:t>
+            </a:r>
+            <a:r>
+              <a:rPr lang="en-GB" dirty="0" smtClean="0">
+                <a:solidFill>
+                  <a:schemeClr val="tx1"/>
+                </a:solidFill>
+              </a:rPr>
+              <a:t>Artificial Intelligence for Fox and Sheep to move and react</a:t>
+            </a:r>
+          </a:p>
+          <a:p>
+            <a:pPr marL="411480" lvl="1" indent="0">
+              <a:buFont typeface="Wingdings" pitchFamily="2" charset="2"/>
+              <a:buChar char="§"/>
+            </a:pPr>
+            <a:r>
+              <a:rPr lang="en-GB" dirty="0" smtClean="0">
+                <a:solidFill>
+                  <a:schemeClr val="tx1"/>
+                </a:solidFill>
+              </a:rPr>
+              <a:t> </a:t>
+            </a:r>
+            <a:r>
+              <a:rPr lang="en-GB" dirty="0" smtClean="0">
+                <a:solidFill>
+                  <a:schemeClr val="tx1"/>
+                </a:solidFill>
+              </a:rPr>
+              <a:t>Three main screens: home screen, settings, and game screen</a:t>
+            </a:r>
+          </a:p>
+          <a:p>
+            <a:pPr marL="411480" lvl="1" indent="0">
+              <a:buFont typeface="Wingdings" pitchFamily="2" charset="2"/>
+              <a:buChar char="§"/>
+            </a:pPr>
+            <a:r>
+              <a:rPr lang="en-GB" dirty="0" smtClean="0">
+                <a:solidFill>
+                  <a:schemeClr val="tx1"/>
+                </a:solidFill>
+              </a:rPr>
+              <a:t> </a:t>
+            </a:r>
+            <a:r>
+              <a:rPr lang="en-GB" dirty="0" smtClean="0">
+                <a:solidFill>
+                  <a:schemeClr val="tx1"/>
+                </a:solidFill>
+              </a:rPr>
+              <a:t>Ability to control speed of animals (by default:  fox’s speed &gt; dog’s &gt; sheep’s)</a:t>
+            </a:r>
+            <a:endParaRPr lang="en-GB" b="1" u="sng" dirty="0" smtClean="0">
+              <a:solidFill>
+                <a:srgbClr val="FF0000"/>
+              </a:solidFill>
+            </a:endParaRPr>
+          </a:p>
+          <a:p>
+            <a:pPr marL="777240" lvl="2" indent="0">
+              <a:buFont typeface="Courier New" pitchFamily="49" charset="0"/>
+              <a:buChar char="o"/>
+            </a:pPr>
+            <a:endParaRPr lang="en-US" dirty="0" smtClean="0"/>
           </a:p>
           <a:p>
             <a:pPr marL="0" indent="0">
@@ -11777,33 +11875,7 @@
             </a:r>
             <a:r>
               <a:rPr lang="en-US" dirty="0" smtClean="0"/>
-              <a:t>    - sensitive to the location of dog</a:t>
-            </a:r>
-          </a:p>
-          <a:p>
-            <a:pPr marL="0" indent="0">
-              <a:buNone/>
-            </a:pPr>
-            <a:r>
-              <a:rPr lang="en-US" dirty="0"/>
-              <a:t> </a:t>
-            </a:r>
-            <a:r>
-              <a:rPr lang="en-US" dirty="0" smtClean="0"/>
-              <a:t>    - able to run toward a sheep and eat him</a:t>
-            </a:r>
-          </a:p>
-          <a:p>
-            <a:pPr marL="0" indent="0">
-              <a:buNone/>
-            </a:pPr>
-            <a:r>
-              <a:rPr lang="en-US" dirty="0"/>
-              <a:t> </a:t>
-            </a:r>
-            <a:r>
-              <a:rPr lang="en-US" dirty="0" smtClean="0"/>
-              <a:t>    - able to run away if chased by the dog</a:t>
+              <a:t>   </a:t>
             </a:r>
             <a:endParaRPr lang="en-US" dirty="0"/>
           </a:p>
@@ -11812,7 +11884,7 @@
     </p:spTree>
     <p:extLst>
       <p:ext uri="{BB962C8B-B14F-4D97-AF65-F5344CB8AC3E}">
-        <p14:creationId xmlns:p14="http://schemas.microsoft.com/office/powerpoint/2010/main" val="1595711664"/>
+        <p14:creationId xmlns:p14="http://schemas.microsoft.com/office/powerpoint/2010/main" xmlns="" val="1595711664"/>
       </p:ext>
     </p:extLst>
   </p:cSld>
@@ -11888,7 +11960,7 @@
         </p:spPr>
         <p:txBody>
           <a:bodyPr>
-            <a:normAutofit fontScale="70000" lnSpcReduction="20000"/>
+            <a:normAutofit fontScale="55000" lnSpcReduction="20000"/>
           </a:bodyPr>
           <a:lstStyle/>
           <a:p>
@@ -11905,92 +11977,125 @@
             <a:pPr marL="0" indent="0">
               <a:buNone/>
             </a:pPr>
+            <a:endParaRPr lang="en-GB" dirty="0" smtClean="0"/>
+          </a:p>
+          <a:p>
             <a:r>
               <a:rPr lang="en-GB" b="1" u="sng" dirty="0" smtClean="0">
                 <a:solidFill>
                   <a:srgbClr val="FF0000"/>
                 </a:solidFill>
               </a:rPr>
-              <a:t>Technical </a:t>
-            </a:r>
-            <a:r>
-              <a:rPr lang="en-GB" b="1" u="sng" dirty="0">
-                <a:solidFill>
-                  <a:srgbClr val="FF0000"/>
-                </a:solidFill>
-              </a:rPr>
-              <a:t>details of what will be </a:t>
-            </a:r>
+              <a:t>Technical details</a:t>
+            </a:r>
+            <a:endParaRPr lang="en-GB" b="1" u="sng" dirty="0" smtClean="0">
+              <a:solidFill>
+                <a:srgbClr val="FF0000"/>
+              </a:solidFill>
+            </a:endParaRPr>
+          </a:p>
+          <a:p>
+            <a:pPr lvl="1">
+              <a:buFont typeface="Wingdings" pitchFamily="2" charset="2"/>
+              <a:buChar char="§"/>
+            </a:pPr>
+            <a:r>
+              <a:rPr lang="en-GB" dirty="0" smtClean="0"/>
+              <a:t>Android application that doesn’t need to contact any service</a:t>
+            </a:r>
+          </a:p>
+          <a:p>
+            <a:pPr lvl="1">
+              <a:buFont typeface="Wingdings" pitchFamily="2" charset="2"/>
+              <a:buChar char="§"/>
+            </a:pPr>
+            <a:r>
+              <a:rPr lang="en-GB" dirty="0" smtClean="0"/>
+              <a:t>Implementation of </a:t>
+            </a:r>
+            <a:r>
+              <a:rPr lang="en-GB" dirty="0" err="1" smtClean="0"/>
+              <a:t>SurfaceView</a:t>
+            </a:r>
+            <a:r>
+              <a:rPr lang="en-GB" dirty="0" smtClean="0"/>
+              <a:t> to render in full screen mode</a:t>
+            </a:r>
+          </a:p>
+          <a:p>
+            <a:pPr lvl="1">
+              <a:buFont typeface="Wingdings" pitchFamily="2" charset="2"/>
+              <a:buChar char="§"/>
+            </a:pPr>
+            <a:r>
+              <a:rPr lang="en-GB" dirty="0" smtClean="0"/>
+              <a:t>Use of fragments to render top bar with “Back” option</a:t>
+            </a:r>
+          </a:p>
+          <a:p>
+            <a:pPr lvl="1">
+              <a:buFont typeface="Wingdings" pitchFamily="2" charset="2"/>
+              <a:buChar char="§"/>
+            </a:pPr>
+            <a:r>
+              <a:rPr lang="en-GB" dirty="0" smtClean="0"/>
+              <a:t>Use of multiple types of UI widgets, including buttons, images, seek bars, and </a:t>
+            </a:r>
+            <a:r>
+              <a:rPr lang="en-GB" dirty="0" err="1" smtClean="0"/>
+              <a:t>textViews</a:t>
+            </a:r>
+            <a:r>
+              <a:rPr lang="en-GB" dirty="0" smtClean="0"/>
+              <a:t/>
+            </a:r>
+            <a:br>
+              <a:rPr lang="en-GB" dirty="0" smtClean="0"/>
+            </a:br>
+            <a:endParaRPr lang="en-GB" dirty="0"/>
+          </a:p>
+          <a:p>
+            <a:pPr marL="0" indent="0">
+              <a:buNone/>
+            </a:pPr>
+            <a:endParaRPr lang="en-GB" dirty="0" smtClean="0"/>
+          </a:p>
+          <a:p>
             <a:r>
               <a:rPr lang="en-GB" b="1" u="sng" dirty="0" smtClean="0">
                 <a:solidFill>
                   <a:srgbClr val="FF0000"/>
                 </a:solidFill>
               </a:rPr>
-              <a:t>used:</a:t>
-            </a:r>
-            <a:endParaRPr lang="en-GB" dirty="0"/>
-          </a:p>
-          <a:p>
-            <a:r>
-              <a:rPr lang="en-GB" dirty="0" smtClean="0"/>
-              <a:t>Using Java API- creating classes; implementing interfaces </a:t>
-            </a:r>
-          </a:p>
-          <a:p>
-            <a:r>
-              <a:rPr lang="en-GB" dirty="0" smtClean="0"/>
-              <a:t>Android API- whatever method is and features that suite our project.</a:t>
-            </a:r>
-          </a:p>
-          <a:p>
-            <a:pPr marL="0" indent="0">
+              <a:t>Bi-weekly Schedule</a:t>
+            </a:r>
+            <a:endParaRPr lang="en-GB" b="1" u="sng" dirty="0" smtClean="0">
+              <a:solidFill>
+                <a:srgbClr val="FF0000"/>
+              </a:solidFill>
+            </a:endParaRPr>
+          </a:p>
+          <a:p>
+            <a:pPr marL="411480" lvl="1" indent="0">
               <a:buNone/>
             </a:pPr>
-            <a:endParaRPr lang="en-GB" dirty="0" smtClean="0"/>
-          </a:p>
-          <a:p>
-            <a:pPr marL="0" indent="0">
+            <a:endParaRPr lang="en-GB" b="1" dirty="0" smtClean="0">
+              <a:solidFill>
+                <a:schemeClr val="accent4"/>
+              </a:solidFill>
+            </a:endParaRPr>
+          </a:p>
+          <a:p>
+            <a:pPr marL="411480" lvl="1" indent="0">
               <a:buNone/>
             </a:pPr>
-            <a:endParaRPr lang="en-GB" dirty="0"/>
-          </a:p>
-          <a:p>
-            <a:pPr marL="0" indent="0">
-              <a:buNone/>
-            </a:pPr>
-            <a:r>
-              <a:rPr lang="en-GB" b="1" u="sng" dirty="0" smtClean="0">
-                <a:solidFill>
-                  <a:srgbClr val="FF0000"/>
-                </a:solidFill>
-              </a:rPr>
-              <a:t>Bi - weekly Schedule</a:t>
-            </a:r>
-            <a:r>
-              <a:rPr lang="en-GB" u="sng" dirty="0" smtClean="0"/>
-              <a:t>:</a:t>
-            </a:r>
-          </a:p>
-          <a:p>
-            <a:pPr marL="0" indent="0">
-              <a:buNone/>
-            </a:pPr>
-            <a:r>
-              <a:rPr lang="en-GB" dirty="0"/>
-              <a:t> </a:t>
-            </a:r>
-            <a:r>
-              <a:rPr lang="en-GB" dirty="0" smtClean="0"/>
-              <a:t>       </a:t>
-            </a:r>
             <a:r>
               <a:rPr lang="en-GB" b="1" dirty="0" smtClean="0">
                 <a:solidFill>
                   <a:schemeClr val="accent4"/>
                 </a:solidFill>
               </a:rPr>
-              <a:t>Week of Feb </a:t>
+              <a:t>Week </a:t>
             </a:r>
             <a:r>
               <a:rPr lang="en-GB" b="1" dirty="0" smtClean="0">
@@ -11998,53 +12103,36 @@
                   <a:schemeClr val="accent4"/>
                 </a:solidFill>
               </a:rPr>
-              <a:t>18th </a:t>
-            </a:r>
+              <a:t>of Feb 18th </a:t>
+            </a:r>
+            <a:endParaRPr lang="en-GB" dirty="0" smtClean="0"/>
+          </a:p>
+          <a:p>
+            <a:pPr marL="777240" lvl="2" indent="0">
+              <a:buFont typeface="Wingdings" pitchFamily="2" charset="2"/>
+              <a:buChar char="§"/>
+            </a:pPr>
             <a:r>
               <a:rPr lang="en-GB" dirty="0" smtClean="0"/>
-              <a:t>-   Planning phase:</a:t>
-            </a:r>
-          </a:p>
-          <a:p>
-            <a:pPr marL="0" indent="0">
-              <a:buNone/>
+              <a:t> Define requirements</a:t>
+            </a:r>
+          </a:p>
+          <a:p>
+            <a:pPr marL="777240" lvl="2" indent="0">
+              <a:buFont typeface="Wingdings" pitchFamily="2" charset="2"/>
+              <a:buChar char="§"/>
             </a:pPr>
             <a:r>
-              <a:rPr lang="en-GB" dirty="0"/>
+              <a:rPr lang="en-GB" dirty="0" smtClean="0"/>
               <a:t> </a:t>
             </a:r>
             <a:r>
               <a:rPr lang="en-GB" dirty="0" smtClean="0"/>
-              <a:t>             - </a:t>
+              <a:t>Create </a:t>
             </a:r>
             <a:r>
               <a:rPr lang="en-GB" dirty="0" smtClean="0"/>
-              <a:t>create a simple</a:t>
-            </a:r>
-            <a:r>
-              <a:rPr lang="en-GB" dirty="0" smtClean="0"/>
-              <a:t> specification</a:t>
-            </a:r>
-          </a:p>
-          <a:p>
-            <a:pPr marL="0" indent="0">
-              <a:buNone/>
-            </a:pPr>
-            <a:r>
-              <a:rPr lang="en-GB" dirty="0"/>
-              <a:t> </a:t>
-            </a:r>
-            <a:r>
-              <a:rPr lang="en-GB" dirty="0" smtClean="0"/>
-              <a:t>             - Create a </a:t>
-            </a:r>
-            <a:r>
-              <a:rPr lang="en-GB" dirty="0" smtClean="0"/>
-              <a:t>Use </a:t>
-            </a:r>
-            <a:r>
-              <a:rPr lang="en-GB" dirty="0" smtClean="0"/>
-              <a:t>Case </a:t>
+              <a:t>a Use Case </a:t>
             </a:r>
             <a:r>
               <a:rPr lang="en-GB" dirty="0" smtClean="0"/>
@@ -12052,30 +12140,101 @@
             </a:r>
           </a:p>
           <a:p>
-            <a:pPr marL="0" indent="0">
-              <a:buNone/>
+            <a:pPr marL="777240" lvl="2" indent="0">
+              <a:buFont typeface="Wingdings" pitchFamily="2" charset="2"/>
+              <a:buChar char="§"/>
             </a:pPr>
             <a:r>
-              <a:rPr lang="en-GB" dirty="0"/>
+              <a:rPr lang="en-GB" dirty="0" smtClean="0"/>
               <a:t> </a:t>
             </a:r>
             <a:r>
               <a:rPr lang="en-GB" dirty="0" smtClean="0"/>
-              <a:t>             - Create basic Design and navigation process</a:t>
-            </a:r>
-            <a:endParaRPr lang="en-GB" dirty="0" smtClean="0"/>
-          </a:p>
-          <a:p>
-            <a:pPr marL="0" indent="0">
-              <a:buNone/>
+              <a:t>Create </a:t>
+            </a:r>
+            <a:r>
+              <a:rPr lang="en-GB" dirty="0" smtClean="0"/>
+              <a:t>basic Design and navigation </a:t>
+            </a:r>
+            <a:r>
+              <a:rPr lang="en-GB" dirty="0" smtClean="0"/>
+              <a:t>process</a:t>
+            </a:r>
+          </a:p>
+          <a:p>
+            <a:pPr marL="777240" lvl="2" indent="0">
+              <a:buFont typeface="Wingdings" pitchFamily="2" charset="2"/>
+              <a:buChar char="§"/>
             </a:pPr>
             <a:r>
-              <a:rPr lang="en-GB" dirty="0"/>
+              <a:rPr lang="en-GB" dirty="0" smtClean="0"/>
               <a:t> </a:t>
             </a:r>
             <a:r>
               <a:rPr lang="en-GB" dirty="0" smtClean="0"/>
-              <a:t>             - Create an initial presentation</a:t>
+              <a:t>Create </a:t>
+            </a:r>
+            <a:r>
+              <a:rPr lang="en-GB" dirty="0" smtClean="0"/>
+              <a:t>an initial </a:t>
+            </a:r>
+            <a:r>
+              <a:rPr lang="en-GB" dirty="0" smtClean="0"/>
+              <a:t>presentation</a:t>
+            </a:r>
+          </a:p>
+          <a:p>
+            <a:pPr marL="777240" lvl="2" indent="0">
+              <a:buFont typeface="Wingdings" pitchFamily="2" charset="2"/>
+              <a:buChar char="§"/>
+            </a:pPr>
+            <a:r>
+              <a:rPr lang="en-GB" dirty="0" smtClean="0"/>
+              <a:t> Determine </a:t>
+            </a:r>
+            <a:r>
+              <a:rPr lang="en-GB" dirty="0" smtClean="0"/>
+              <a:t>the classes, methods and </a:t>
+            </a:r>
+            <a:r>
+              <a:rPr lang="en-GB" dirty="0" smtClean="0"/>
+              <a:t>attributes</a:t>
+            </a:r>
+          </a:p>
+          <a:p>
+            <a:pPr marL="777240" lvl="2" indent="0">
+              <a:buFont typeface="Wingdings" pitchFamily="2" charset="2"/>
+              <a:buChar char="§"/>
+            </a:pPr>
+            <a:r>
+              <a:rPr lang="en-GB" dirty="0" smtClean="0"/>
+              <a:t> </a:t>
+            </a:r>
+            <a:r>
+              <a:rPr lang="en-GB" dirty="0" smtClean="0"/>
+              <a:t>Create </a:t>
+            </a:r>
+            <a:r>
+              <a:rPr lang="en-GB" dirty="0" smtClean="0"/>
+              <a:t>activity </a:t>
+            </a:r>
+            <a:r>
+              <a:rPr lang="en-GB" dirty="0" smtClean="0"/>
+              <a:t>diagram</a:t>
+            </a:r>
+          </a:p>
+          <a:p>
+            <a:pPr marL="777240" lvl="2" indent="0">
+              <a:buFont typeface="Wingdings" pitchFamily="2" charset="2"/>
+              <a:buChar char="§"/>
+            </a:pPr>
+            <a:r>
+              <a:rPr lang="en-GB" dirty="0" smtClean="0"/>
+              <a:t> </a:t>
+            </a:r>
+            <a:r>
+              <a:rPr lang="en-GB" dirty="0" smtClean="0"/>
+              <a:t>Start with Proof of concept (POC)</a:t>
             </a:r>
             <a:endParaRPr lang="en-GB" dirty="0" smtClean="0"/>
           </a:p>
@@ -12103,7 +12262,7 @@
                   <a:schemeClr val="accent4"/>
                 </a:solidFill>
               </a:rPr>
-              <a:t>Week of </a:t>
+              <a:t>Week of March </a:t>
             </a:r>
             <a:r>
               <a:rPr lang="en-GB" b="1" dirty="0" smtClean="0">
@@ -12111,7 +12270,7 @@
                   <a:schemeClr val="accent4"/>
                 </a:solidFill>
               </a:rPr>
-              <a:t>March 4</a:t>
+              <a:t>4</a:t>
             </a:r>
             <a:r>
               <a:rPr lang="en-GB" b="1" baseline="30000" dirty="0" smtClean="0">
@@ -12121,18 +12280,12 @@
               </a:rPr>
               <a:t>th</a:t>
             </a:r>
-            <a:r>
-              <a:rPr lang="en-GB" dirty="0" smtClean="0"/>
-              <a:t> </a:t>
-            </a:r>
-            <a:r>
-              <a:rPr lang="en-GB" dirty="0" smtClean="0"/>
-              <a:t>-   Analysis phase: </a:t>
-            </a:r>
-          </a:p>
-          <a:p>
-            <a:pPr marL="0" indent="0">
-              <a:buNone/>
+            <a:endParaRPr lang="en-GB" dirty="0" smtClean="0"/>
+          </a:p>
+          <a:p>
+            <a:pPr marL="777240" lvl="2" indent="0">
+              <a:buFont typeface="Wingdings" pitchFamily="2" charset="2"/>
+              <a:buChar char="§"/>
             </a:pPr>
             <a:r>
               <a:rPr lang="en-GB" dirty="0"/>
@@ -12140,71 +12293,32 @@
             </a:r>
             <a:r>
               <a:rPr lang="en-GB" dirty="0" smtClean="0"/>
-              <a:t>              - Re-visiting the specification</a:t>
-            </a:r>
-          </a:p>
-          <a:p>
-            <a:pPr marL="0" indent="0">
-              <a:buNone/>
+              <a:t>Finish auxiliary screens (settings and main)</a:t>
+            </a:r>
+          </a:p>
+          <a:p>
+            <a:pPr marL="777240" lvl="2" indent="0">
+              <a:buFont typeface="Wingdings" pitchFamily="2" charset="2"/>
+              <a:buChar char="§"/>
             </a:pPr>
             <a:r>
-              <a:rPr lang="en-GB" dirty="0"/>
-              <a:t> </a:t>
-            </a:r>
-            <a:r>
               <a:rPr lang="en-GB" dirty="0" smtClean="0"/>
-              <a:t>              -  </a:t>
+              <a:t> Unit </a:t>
             </a:r>
             <a:r>
               <a:rPr lang="en-GB" dirty="0" smtClean="0"/>
-              <a:t>Determine </a:t>
+              <a:t>and integration </a:t>
             </a:r>
             <a:r>
               <a:rPr lang="en-GB" dirty="0" smtClean="0"/>
-              <a:t>the classes, methods and variable</a:t>
-            </a:r>
-          </a:p>
-          <a:p>
-            <a:pPr marL="0" indent="0">
+              <a:t>testing on these screens</a:t>
+            </a:r>
+            <a:endParaRPr lang="en-GB" dirty="0" smtClean="0"/>
+          </a:p>
+          <a:p>
+            <a:pPr marL="777240" lvl="2" indent="0">
               <a:buNone/>
             </a:pPr>
-            <a:r>
-              <a:rPr lang="en-GB" dirty="0"/>
-              <a:t> </a:t>
-            </a:r>
-            <a:r>
-              <a:rPr lang="en-GB" dirty="0" smtClean="0"/>
-              <a:t>               - </a:t>
-            </a:r>
-            <a:r>
-              <a:rPr lang="en-GB" dirty="0" smtClean="0"/>
-              <a:t>Creat</a:t>
-            </a:r>
-            <a:r>
-              <a:rPr lang="en-GB" dirty="0" smtClean="0"/>
-              <a:t>e a</a:t>
-            </a:r>
-            <a:r>
-              <a:rPr lang="en-GB" dirty="0" smtClean="0"/>
-              <a:t>ctivity </a:t>
-            </a:r>
-            <a:r>
-              <a:rPr lang="en-GB" dirty="0" smtClean="0"/>
-              <a:t>diagram</a:t>
-            </a:r>
-          </a:p>
-          <a:p>
-            <a:pPr marL="0" indent="0">
-              <a:buNone/>
-            </a:pPr>
-            <a:r>
-              <a:rPr lang="en-GB" dirty="0"/>
-              <a:t> </a:t>
-            </a:r>
-            <a:r>
-              <a:rPr lang="en-GB" dirty="0" smtClean="0"/>
-              <a:t>                              </a:t>
-            </a:r>
             <a:endParaRPr lang="en-GB" dirty="0"/>
           </a:p>
         </p:txBody>
@@ -12212,7 +12326,7 @@
     </p:spTree>
     <p:extLst>
       <p:ext uri="{BB962C8B-B14F-4D97-AF65-F5344CB8AC3E}">
-        <p14:creationId xmlns:p14="http://schemas.microsoft.com/office/powerpoint/2010/main" val="1326768430"/>
+        <p14:creationId xmlns:p14="http://schemas.microsoft.com/office/powerpoint/2010/main" xmlns="" val="1326768430"/>
       </p:ext>
     </p:extLst>
   </p:cSld>
@@ -12301,35 +12415,11 @@
             </a:r>
           </a:p>
           <a:p>
-            <a:pPr marL="0" indent="0">
+            <a:pPr marL="411480" lvl="1" indent="0">
               <a:buNone/>
             </a:pPr>
             <a:r>
-              <a:rPr lang="en-GB" sz="1900" b="1">
-                <a:solidFill>
-                  <a:schemeClr val="accent4"/>
-                </a:solidFill>
-              </a:rPr>
-              <a:t> </a:t>
-            </a:r>
-            <a:r>
-              <a:rPr lang="en-GB" sz="1900" b="1" smtClean="0">
-                <a:solidFill>
-                  <a:schemeClr val="accent4"/>
-                </a:solidFill>
-              </a:rPr>
-              <a:t>   </a:t>
-            </a:r>
-            <a:r>
-              <a:rPr lang="en-GB" sz="1900" b="1" smtClean="0">
-                <a:solidFill>
-                  <a:schemeClr val="accent4"/>
-                </a:solidFill>
-              </a:rPr>
-              <a:t>     </a:t>
-            </a:r>
-            <a:r>
-              <a:rPr lang="en-GB" sz="1800" b="1" smtClean="0">
+              <a:rPr lang="en-GB" sz="1600" b="1" dirty="0" smtClean="0">
                 <a:solidFill>
                   <a:schemeClr val="accent4"/>
                 </a:solidFill>
@@ -12337,7 +12427,7 @@
               <a:t>Week </a:t>
             </a:r>
             <a:r>
-              <a:rPr lang="en-GB" sz="1800" b="1" dirty="0">
+              <a:rPr lang="en-GB" sz="1600" b="1" dirty="0">
                 <a:solidFill>
                   <a:schemeClr val="accent4"/>
                 </a:solidFill>
@@ -12345,236 +12435,186 @@
               <a:t>of March </a:t>
             </a:r>
             <a:r>
-              <a:rPr lang="en-GB" sz="1800" b="1" dirty="0" smtClean="0">
+              <a:rPr lang="en-GB" sz="1600" b="1" dirty="0" smtClean="0">
                 <a:solidFill>
                   <a:schemeClr val="accent4"/>
                 </a:solidFill>
               </a:rPr>
               <a:t>18th</a:t>
             </a:r>
-            <a:r>
-              <a:rPr lang="en-GB" sz="1800" b="1" dirty="0" smtClean="0">
+            <a:endParaRPr lang="en-GB" sz="1600" dirty="0"/>
+          </a:p>
+          <a:p>
+            <a:pPr marL="777240" lvl="2" indent="0">
+              <a:buFont typeface="Wingdings" pitchFamily="2" charset="2"/>
+              <a:buChar char="§"/>
+            </a:pPr>
+            <a:r>
+              <a:rPr lang="en-GB" sz="1400" dirty="0"/>
+              <a:t> </a:t>
+            </a:r>
+            <a:r>
+              <a:rPr lang="en-GB" sz="1400" dirty="0" smtClean="0"/>
+              <a:t>Start work on the game screen (control and render the dog)</a:t>
+            </a:r>
+            <a:endParaRPr lang="en-GB" dirty="0" smtClean="0"/>
+          </a:p>
+          <a:p>
+            <a:pPr marL="411480" lvl="1" indent="0">
+              <a:buNone/>
+            </a:pPr>
+            <a:endParaRPr lang="en-GB" sz="1700" b="1" dirty="0" smtClean="0">
+              <a:solidFill>
+                <a:schemeClr val="accent4"/>
+              </a:solidFill>
+            </a:endParaRPr>
+          </a:p>
+          <a:p>
+            <a:pPr marL="411480" lvl="1" indent="0">
+              <a:buNone/>
+            </a:pPr>
+            <a:r>
+              <a:rPr lang="en-GB" sz="1700" b="1" dirty="0" smtClean="0">
                 <a:solidFill>
                   <a:schemeClr val="accent4"/>
                 </a:solidFill>
               </a:rPr>
-              <a:t> </a:t>
-            </a:r>
-            <a:r>
-              <a:rPr lang="en-GB" sz="1800" dirty="0"/>
-              <a:t>– pre implementation </a:t>
-            </a:r>
-            <a:r>
-              <a:rPr lang="en-GB" sz="1800" dirty="0" smtClean="0"/>
-              <a:t>phase:</a:t>
-            </a:r>
-            <a:endParaRPr lang="en-GB" sz="1800" dirty="0"/>
-          </a:p>
-          <a:p>
-            <a:pPr marL="0" indent="0">
-              <a:buNone/>
-            </a:pPr>
-            <a:r>
-              <a:rPr lang="en-GB" sz="1800" dirty="0"/>
-              <a:t>                </a:t>
-            </a:r>
-            <a:r>
-              <a:rPr lang="en-GB" sz="1800" dirty="0" smtClean="0"/>
-              <a:t>- </a:t>
-            </a:r>
-            <a:r>
-              <a:rPr lang="en-GB" sz="1800" dirty="0" smtClean="0"/>
-              <a:t>forming the </a:t>
-            </a:r>
-            <a:r>
-              <a:rPr lang="en-GB" sz="1800" dirty="0" smtClean="0"/>
-              <a:t>project pseudo code </a:t>
-            </a:r>
-            <a:r>
-              <a:rPr lang="en-GB" sz="1800" dirty="0" smtClean="0"/>
-              <a:t> </a:t>
-            </a:r>
-            <a:endParaRPr lang="en-GB" sz="1800" dirty="0" smtClean="0"/>
-          </a:p>
-          <a:p>
-            <a:pPr marL="0" indent="0">
-              <a:buNone/>
-            </a:pPr>
-            <a:endParaRPr lang="en-GB" dirty="0" smtClean="0"/>
-          </a:p>
-          <a:p>
-            <a:pPr marL="0" indent="0">
-              <a:buNone/>
-            </a:pPr>
-            <a:r>
-              <a:rPr lang="en-GB" dirty="0"/>
-              <a:t> </a:t>
-            </a:r>
-            <a:r>
-              <a:rPr lang="en-GB" dirty="0" smtClean="0"/>
-              <a:t>       </a:t>
-            </a:r>
-            <a:r>
-              <a:rPr lang="en-GB" sz="1900" b="1" dirty="0" smtClean="0">
+              <a:t>Week </a:t>
+            </a:r>
+            <a:r>
+              <a:rPr lang="en-GB" sz="1700" b="1" dirty="0" smtClean="0">
                 <a:solidFill>
                   <a:schemeClr val="accent4"/>
                 </a:solidFill>
               </a:rPr>
-              <a:t>Week of </a:t>
-            </a:r>
-            <a:r>
-              <a:rPr lang="en-GB" sz="1900" b="1" dirty="0" smtClean="0">
+              <a:t>of April </a:t>
+            </a:r>
+            <a:r>
+              <a:rPr lang="en-GB" sz="1700" b="1" dirty="0" smtClean="0">
                 <a:solidFill>
                   <a:schemeClr val="accent4"/>
                 </a:solidFill>
               </a:rPr>
-              <a:t>April 1st</a:t>
-            </a:r>
-            <a:r>
-              <a:rPr lang="en-GB" sz="1900" b="1" dirty="0" smtClean="0">
+              <a:t>1st</a:t>
+            </a:r>
+            <a:endParaRPr lang="en-GB" sz="1600" dirty="0" smtClean="0"/>
+          </a:p>
+          <a:p>
+            <a:pPr marL="777240" lvl="2" indent="0">
+              <a:buFont typeface="Wingdings" pitchFamily="2" charset="2"/>
+              <a:buChar char="§"/>
+            </a:pPr>
+            <a:r>
+              <a:rPr lang="en-GB" sz="1400" dirty="0" smtClean="0"/>
+              <a:t> </a:t>
+            </a:r>
+            <a:r>
+              <a:rPr lang="en-GB" sz="1400" dirty="0" smtClean="0"/>
+              <a:t>Continue work </a:t>
+            </a:r>
+            <a:r>
+              <a:rPr lang="en-GB" sz="1400" dirty="0" smtClean="0"/>
+              <a:t>on the game screen </a:t>
+            </a:r>
+            <a:r>
+              <a:rPr lang="en-GB" sz="1400" dirty="0" smtClean="0"/>
+              <a:t>(fox and sheep)</a:t>
+            </a:r>
+            <a:endParaRPr lang="en-GB" dirty="0" smtClean="0"/>
+          </a:p>
+          <a:p>
+            <a:pPr marL="411480" lvl="1" indent="0">
+              <a:buNone/>
+            </a:pPr>
+            <a:endParaRPr lang="en-GB" sz="1700" b="1" dirty="0" smtClean="0">
+              <a:solidFill>
+                <a:schemeClr val="accent4"/>
+              </a:solidFill>
+            </a:endParaRPr>
+          </a:p>
+          <a:p>
+            <a:pPr marL="411480" lvl="1" indent="0">
+              <a:buNone/>
+            </a:pPr>
+            <a:r>
+              <a:rPr lang="en-GB" sz="1700" b="1" dirty="0" smtClean="0">
                 <a:solidFill>
                   <a:schemeClr val="accent4"/>
                 </a:solidFill>
               </a:rPr>
+              <a:t>Week of April 15th</a:t>
+            </a:r>
+          </a:p>
+          <a:p>
+            <a:pPr marL="777240" lvl="2" indent="0">
+              <a:buFont typeface="Wingdings" pitchFamily="2" charset="2"/>
+              <a:buChar char="§"/>
+            </a:pPr>
+            <a:r>
+              <a:rPr lang="en-GB" sz="1500" dirty="0" smtClean="0"/>
               <a:t> </a:t>
             </a:r>
             <a:r>
-              <a:rPr lang="en-GB" sz="1900" dirty="0" smtClean="0"/>
-              <a:t>– implementation phase:</a:t>
-            </a:r>
-          </a:p>
-          <a:p>
-            <a:pPr marL="0" indent="0">
-              <a:buNone/>
+              <a:rPr lang="en-GB" sz="1600" dirty="0" smtClean="0"/>
+              <a:t>Continue work on the game screen (fox and sheep</a:t>
+            </a:r>
+            <a:r>
+              <a:rPr lang="en-GB" sz="1600" dirty="0" smtClean="0"/>
+              <a:t>)</a:t>
+            </a:r>
+          </a:p>
+          <a:p>
+            <a:pPr marL="777240" lvl="2" indent="0">
+              <a:buFont typeface="Wingdings" pitchFamily="2" charset="2"/>
+              <a:buChar char="§"/>
             </a:pPr>
             <a:r>
-              <a:rPr lang="en-GB" sz="1900" dirty="0"/>
+              <a:rPr lang="en-GB" sz="1500" dirty="0" smtClean="0"/>
+              <a:t> Final touches</a:t>
+            </a:r>
+          </a:p>
+          <a:p>
+            <a:pPr marL="777240" lvl="2" indent="0">
+              <a:buFont typeface="Wingdings" pitchFamily="2" charset="2"/>
+              <a:buChar char="§"/>
+            </a:pPr>
+            <a:r>
+              <a:rPr lang="en-GB" sz="1500" dirty="0" smtClean="0"/>
               <a:t> </a:t>
             </a:r>
             <a:r>
-              <a:rPr lang="en-GB" sz="1900" dirty="0" smtClean="0"/>
-              <a:t>               - coding and unit testing </a:t>
-            </a:r>
-          </a:p>
-          <a:p>
-            <a:pPr marL="0" indent="0">
+              <a:rPr lang="en-GB" sz="1500" dirty="0" smtClean="0"/>
+              <a:t>Submit code to professor</a:t>
+            </a:r>
+          </a:p>
+          <a:p>
+            <a:pPr marL="777240" lvl="2" indent="0">
               <a:buNone/>
             </a:pPr>
             <a:endParaRPr lang="en-GB" sz="1900" dirty="0" smtClean="0"/>
           </a:p>
           <a:p>
-            <a:pPr marL="0" indent="0">
+            <a:pPr marL="411480" lvl="1" indent="0">
               <a:buNone/>
             </a:pPr>
             <a:r>
-              <a:rPr lang="en-GB" sz="1900" dirty="0"/>
-              <a:t> </a:t>
-            </a:r>
-            <a:r>
-              <a:rPr lang="en-GB" sz="1900" dirty="0" smtClean="0"/>
-              <a:t>       </a:t>
-            </a:r>
-            <a:r>
-              <a:rPr lang="en-GB" sz="1900" b="1" dirty="0" smtClean="0">
+              <a:rPr lang="en-GB" sz="1700" b="1" dirty="0" smtClean="0">
                 <a:solidFill>
                   <a:schemeClr val="accent4"/>
                 </a:solidFill>
               </a:rPr>
-              <a:t>Week of </a:t>
-            </a:r>
-            <a:r>
-              <a:rPr lang="en-GB" sz="1900" b="1" dirty="0" smtClean="0">
+              <a:t>Week </a:t>
+            </a:r>
+            <a:r>
+              <a:rPr lang="en-GB" sz="1700" b="1" dirty="0" smtClean="0">
                 <a:solidFill>
                   <a:schemeClr val="accent4"/>
                 </a:solidFill>
               </a:rPr>
-              <a:t>April</a:t>
-            </a:r>
-            <a:r>
-              <a:rPr lang="en-GB" sz="1900" b="1" dirty="0" smtClean="0">
-                <a:solidFill>
-                  <a:schemeClr val="accent4"/>
-                </a:solidFill>
-              </a:rPr>
-              <a:t> 15th </a:t>
-            </a:r>
-            <a:r>
-              <a:rPr lang="en-GB" sz="1900" b="1" dirty="0" smtClean="0">
-                <a:solidFill>
-                  <a:schemeClr val="accent4"/>
-                </a:solidFill>
-              </a:rPr>
-              <a:t>– </a:t>
-            </a:r>
-            <a:r>
-              <a:rPr lang="en-GB" sz="1900" dirty="0" smtClean="0"/>
-              <a:t>Source Code:</a:t>
-            </a:r>
-            <a:endParaRPr lang="en-GB" sz="1900" b="1" dirty="0" smtClean="0">
-              <a:solidFill>
-                <a:schemeClr val="accent4"/>
-              </a:solidFill>
-            </a:endParaRPr>
-          </a:p>
-          <a:p>
-            <a:pPr marL="0" indent="0">
-              <a:buNone/>
-            </a:pPr>
-            <a:r>
-              <a:rPr lang="en-GB" sz="1900" dirty="0"/>
-              <a:t> </a:t>
-            </a:r>
-            <a:r>
-              <a:rPr lang="en-GB" sz="1900" dirty="0" smtClean="0"/>
-              <a:t>                 - units integration and </a:t>
-            </a:r>
-            <a:r>
-              <a:rPr lang="en-GB" sz="1900" dirty="0" smtClean="0"/>
-              <a:t>testing</a:t>
-            </a:r>
-            <a:endParaRPr lang="en-GB" sz="1900" b="1" u="sng" dirty="0" smtClean="0">
-              <a:solidFill>
-                <a:schemeClr val="accent4"/>
-              </a:solidFill>
-            </a:endParaRPr>
-          </a:p>
-          <a:p>
-            <a:pPr marL="0" indent="0">
-              <a:buNone/>
-            </a:pPr>
-            <a:r>
-              <a:rPr lang="en-GB" sz="1900" dirty="0" smtClean="0"/>
-              <a:t>                  - Submitting the source code to professor</a:t>
-            </a:r>
-          </a:p>
-          <a:p>
-            <a:pPr marL="0" indent="0">
-              <a:buNone/>
-            </a:pPr>
-            <a:endParaRPr lang="en-GB" sz="1900" dirty="0" smtClean="0"/>
-          </a:p>
-          <a:p>
-            <a:pPr marL="0" indent="0">
-              <a:buNone/>
-            </a:pPr>
-            <a:r>
-              <a:rPr lang="en-GB" sz="1900" dirty="0"/>
-              <a:t> </a:t>
-            </a:r>
-            <a:r>
-              <a:rPr lang="en-GB" sz="1900" dirty="0" smtClean="0"/>
-              <a:t>          </a:t>
-            </a:r>
-            <a:r>
-              <a:rPr lang="en-GB" sz="1900" b="1" dirty="0" smtClean="0">
-                <a:solidFill>
-                  <a:schemeClr val="accent4"/>
-                </a:solidFill>
-              </a:rPr>
-              <a:t>Week of April </a:t>
-            </a:r>
-            <a:r>
-              <a:rPr lang="en-GB" sz="1900" b="1" dirty="0" smtClean="0">
+              <a:t>of April </a:t>
+            </a:r>
+            <a:r>
+              <a:rPr lang="en-GB" sz="1700" b="1" dirty="0" smtClean="0">
                 <a:solidFill>
                   <a:schemeClr val="accent4"/>
                 </a:solidFill>
@@ -12582,33 +12622,27 @@
               <a:t>29</a:t>
             </a:r>
             <a:r>
-              <a:rPr lang="en-GB" sz="1900" b="1" baseline="30000" dirty="0" smtClean="0">
+              <a:rPr lang="en-GB" sz="1700" b="1" baseline="30000" dirty="0" smtClean="0">
                 <a:solidFill>
                   <a:schemeClr val="accent4"/>
                 </a:solidFill>
               </a:rPr>
               <a:t>th</a:t>
             </a:r>
-            <a:r>
-              <a:rPr lang="en-GB" sz="1900" b="1" dirty="0" smtClean="0">
-                <a:solidFill>
-                  <a:schemeClr val="accent4"/>
-                </a:solidFill>
-              </a:rPr>
-              <a:t> </a:t>
-            </a:r>
-            <a:r>
-              <a:rPr lang="en-GB" sz="1900" dirty="0" smtClean="0"/>
-              <a:t>– Class presentation:</a:t>
-            </a:r>
-          </a:p>
-          <a:p>
-            <a:pPr marL="0" indent="0">
-              <a:buNone/>
+            <a:endParaRPr lang="en-GB" sz="1700" dirty="0" smtClean="0"/>
+          </a:p>
+          <a:p>
+            <a:pPr marL="777240" lvl="2" indent="0">
+              <a:buFont typeface="Wingdings" pitchFamily="2" charset="2"/>
+              <a:buChar char="§"/>
             </a:pPr>
             <a:r>
-              <a:rPr lang="en-GB" sz="1900" dirty="0" smtClean="0"/>
-              <a:t>                    -Presenting the program in class</a:t>
+              <a:rPr lang="en-GB" sz="1500" dirty="0" smtClean="0"/>
+              <a:t> Presenting </a:t>
+            </a:r>
+            <a:r>
+              <a:rPr lang="en-GB" sz="1500" dirty="0" smtClean="0"/>
+              <a:t>the program in class</a:t>
             </a:r>
           </a:p>
           <a:p>
@@ -12635,7 +12669,7 @@
     </p:spTree>
     <p:extLst>
       <p:ext uri="{BB962C8B-B14F-4D97-AF65-F5344CB8AC3E}">
-        <p14:creationId xmlns:p14="http://schemas.microsoft.com/office/powerpoint/2010/main" val="3190464469"/>
+        <p14:creationId xmlns:p14="http://schemas.microsoft.com/office/powerpoint/2010/main" xmlns="" val="3190464469"/>
       </p:ext>
     </p:extLst>
   </p:cSld>
@@ -12711,7 +12745,7 @@
         </p:spPr>
         <p:txBody>
           <a:bodyPr>
-            <a:normAutofit fontScale="85000" lnSpcReduction="10000"/>
+            <a:normAutofit fontScale="62500" lnSpcReduction="20000"/>
           </a:bodyPr>
           <a:lstStyle/>
           <a:p>
@@ -12728,36 +12762,37 @@
             <a:pPr marL="0" indent="0">
               <a:buNone/>
             </a:pPr>
+            <a:endParaRPr lang="en-GB" dirty="0" smtClean="0"/>
+          </a:p>
+          <a:p>
             <a:r>
               <a:rPr lang="en-GB" b="1" u="sng" dirty="0" smtClean="0">
                 <a:solidFill>
                   <a:srgbClr val="FF0000"/>
                 </a:solidFill>
               </a:rPr>
-              <a:t>Basic design and navigation:</a:t>
-            </a:r>
-          </a:p>
-          <a:p>
-            <a:r>
-              <a:rPr lang="en-GB" dirty="0" smtClean="0"/>
-              <a:t>A white rectangular figure would represent a sheep</a:t>
-            </a:r>
-          </a:p>
-          <a:p>
-            <a:r>
-              <a:rPr lang="en-GB" dirty="0" smtClean="0"/>
-              <a:t>A brown circular figure would represent the dog</a:t>
-            </a:r>
-          </a:p>
-          <a:p>
-            <a:r>
-              <a:rPr lang="en-GB" dirty="0" smtClean="0"/>
-              <a:t>A triangular figure would represent a fox</a:t>
-            </a:r>
-          </a:p>
-          <a:p>
-            <a:pPr marL="0" indent="0">
-              <a:buNone/>
+              <a:t>Basic </a:t>
+            </a:r>
+            <a:r>
+              <a:rPr lang="en-GB" b="1" u="sng" dirty="0" smtClean="0">
+                <a:solidFill>
+                  <a:srgbClr val="FF0000"/>
+                </a:solidFill>
+              </a:rPr>
+              <a:t>design and navigation:</a:t>
+            </a:r>
+          </a:p>
+          <a:p>
+            <a:pPr lvl="1">
+              <a:buFont typeface="Wingdings" pitchFamily="2" charset="2"/>
+              <a:buChar char="§"/>
+            </a:pPr>
+            <a:endParaRPr lang="en-GB" dirty="0" smtClean="0"/>
+          </a:p>
+          <a:p>
+            <a:pPr lvl="1">
+              <a:buFont typeface="Wingdings" pitchFamily="2" charset="2"/>
+              <a:buChar char="§"/>
             </a:pPr>
             <a:r>
               <a:rPr lang="en-GB" dirty="0" smtClean="0"/>
@@ -12765,12 +12800,77 @@
             </a:r>
             <a:r>
               <a:rPr lang="en-GB" dirty="0" smtClean="0"/>
-              <a:t>person playing the game would use the screen  touch to move the dog as needed. The dog would move to restrict the sheep movement and keep them together. The dog would also move toward an incoming fox to chase him away from </a:t>
+              <a:t>white </a:t>
             </a:r>
             <a:r>
               <a:rPr lang="en-GB" dirty="0" smtClean="0"/>
-              <a:t>sheep.</a:t>
-            </a:r>
+              <a:t>round figure will represent </a:t>
+            </a:r>
+            <a:r>
+              <a:rPr lang="en-GB" dirty="0" smtClean="0"/>
+              <a:t>a sheep</a:t>
+            </a:r>
+          </a:p>
+          <a:p>
+            <a:pPr lvl="1">
+              <a:buFont typeface="Wingdings" pitchFamily="2" charset="2"/>
+              <a:buChar char="§"/>
+            </a:pPr>
+            <a:r>
+              <a:rPr lang="en-GB" dirty="0" smtClean="0"/>
+              <a:t>A </a:t>
+            </a:r>
+            <a:r>
+              <a:rPr lang="en-GB" dirty="0" smtClean="0"/>
+              <a:t>green square figure will represent </a:t>
+            </a:r>
+            <a:r>
+              <a:rPr lang="en-GB" dirty="0" smtClean="0"/>
+              <a:t>the dog</a:t>
+            </a:r>
+          </a:p>
+          <a:p>
+            <a:pPr lvl="1">
+              <a:buFont typeface="Wingdings" pitchFamily="2" charset="2"/>
+              <a:buChar char="§"/>
+            </a:pPr>
+            <a:r>
+              <a:rPr lang="en-GB" dirty="0" smtClean="0"/>
+              <a:t>A </a:t>
+            </a:r>
+            <a:r>
+              <a:rPr lang="en-GB" dirty="0" smtClean="0"/>
+              <a:t>red triangular </a:t>
+            </a:r>
+            <a:r>
+              <a:rPr lang="en-GB" dirty="0" smtClean="0"/>
+              <a:t>figure would represent a fox</a:t>
+            </a:r>
+          </a:p>
+          <a:p>
+            <a:pPr marL="0" indent="0">
+              <a:buNone/>
+            </a:pPr>
+            <a:endParaRPr lang="en-GB" dirty="0" smtClean="0"/>
+          </a:p>
+          <a:p>
+            <a:pPr marL="0" indent="0">
+              <a:buNone/>
+            </a:pPr>
+            <a:r>
+              <a:rPr lang="en-GB" dirty="0" smtClean="0"/>
+              <a:t>Users </a:t>
+            </a:r>
+            <a:r>
+              <a:rPr lang="en-GB" dirty="0" smtClean="0"/>
+              <a:t>can touch the screen on the corners of the screen to represent where they want the dog to move (for example, click anywhere up to move the dog upwards). Keyboard if available is also another type of input (8 moves up, 6 moves right, 2 moves down, and 4 moves left).</a:t>
+            </a:r>
+          </a:p>
+          <a:p>
+            <a:pPr marL="0" indent="0">
+              <a:buNone/>
+            </a:pPr>
+            <a:endParaRPr lang="en-GB" dirty="0" smtClean="0"/>
           </a:p>
           <a:p>
             <a:pPr marL="0" indent="0">
@@ -12782,7 +12882,28 @@
             </a:r>
             <a:r>
               <a:rPr lang="en-GB" dirty="0" smtClean="0"/>
-              <a:t>ttached use case and activity diagram explains the navigation process.</a:t>
+              <a:t>ttached use </a:t>
+            </a:r>
+            <a:r>
+              <a:rPr lang="en-GB" dirty="0" smtClean="0"/>
+              <a:t>case </a:t>
+            </a:r>
+            <a:r>
+              <a:rPr lang="en-GB" dirty="0" smtClean="0"/>
+              <a:t>and activity diagram explains the navigation process</a:t>
+            </a:r>
+            <a:r>
+              <a:rPr lang="en-GB" dirty="0" smtClean="0"/>
+              <a:t>.</a:t>
+            </a:r>
+          </a:p>
+          <a:p>
+            <a:pPr marL="0" indent="0">
+              <a:buNone/>
+            </a:pPr>
+            <a:r>
+              <a:rPr lang="en-GB" dirty="0" smtClean="0"/>
+              <a:t>Also attached is a sketch of how the screens are initially designed to look like.</a:t>
             </a:r>
             <a:endParaRPr lang="en-GB" dirty="0" smtClean="0"/>
           </a:p>
@@ -12791,7 +12912,7 @@
     </p:spTree>
     <p:extLst>
       <p:ext uri="{BB962C8B-B14F-4D97-AF65-F5344CB8AC3E}">
-        <p14:creationId xmlns:p14="http://schemas.microsoft.com/office/powerpoint/2010/main" val="786778175"/>
+        <p14:creationId xmlns:p14="http://schemas.microsoft.com/office/powerpoint/2010/main" xmlns="" val="786778175"/>
       </p:ext>
     </p:extLst>
   </p:cSld>
@@ -12944,7 +13065,7 @@
     </p:spTree>
     <p:extLst>
       <p:ext uri="{BB962C8B-B14F-4D97-AF65-F5344CB8AC3E}">
-        <p14:creationId xmlns:p14="http://schemas.microsoft.com/office/powerpoint/2010/main" val="538637548"/>
+        <p14:creationId xmlns:p14="http://schemas.microsoft.com/office/powerpoint/2010/main" xmlns="" val="538637548"/>
       </p:ext>
     </p:extLst>
   </p:cSld>

</xml_diff>